<commit_message>
Tweaks to SelectActivityDiagram and weixin-koh.adoc
</commit_message>
<xml_diff>
--- a/docs/diagrams/SelectActivityDiagram.pptx
+++ b/docs/diagrams/SelectActivityDiagram.pptx
@@ -3597,8 +3597,8 @@
         </p:nvSpPr>
         <p:spPr>
           <a:xfrm>
-            <a:off x="3244464" y="4076219"/>
-            <a:ext cx="775247" cy="369460"/>
+            <a:off x="2689275" y="4076219"/>
+            <a:ext cx="1228836" cy="369460"/>
           </a:xfrm>
           <a:prstGeom prst="rect">
             <a:avLst/>
@@ -3611,6 +3611,7 @@
           </a:bodyPr>
           <a:lstStyle/>
           <a:p>
+            <a:pPr algn="r"/>
             <a:r>
               <a:rPr lang="en-SG" sz="1801" dirty="0"/>
               <a:t>[else]</a:t>
@@ -3632,8 +3633,8 @@
         </p:nvSpPr>
         <p:spPr>
           <a:xfrm>
-            <a:off x="2590608" y="2872695"/>
-            <a:ext cx="1344895" cy="369460"/>
+            <a:off x="2178760" y="2872695"/>
+            <a:ext cx="1756744" cy="369460"/>
           </a:xfrm>
           <a:prstGeom prst="rect">
             <a:avLst/>
@@ -3646,6 +3647,7 @@
           </a:bodyPr>
           <a:lstStyle/>
           <a:p>
+            <a:pPr algn="r"/>
             <a:r>
               <a:rPr lang="en-SG" sz="1801" dirty="0"/>
               <a:t>[</a:t>
@@ -4303,8 +4305,8 @@
         </p:nvSpPr>
         <p:spPr>
           <a:xfrm>
-            <a:off x="5768252" y="2946227"/>
-            <a:ext cx="1755023" cy="369460"/>
+            <a:off x="5007670" y="2946227"/>
+            <a:ext cx="2515606" cy="369460"/>
           </a:xfrm>
           <a:prstGeom prst="rect">
             <a:avLst/>
@@ -4317,6 +4319,7 @@
           </a:bodyPr>
           <a:lstStyle/>
           <a:p>
+            <a:pPr algn="r"/>
             <a:r>
               <a:rPr lang="en-US" sz="1801" dirty="0"/>
               <a:t>[</a:t>
@@ -4442,8 +4445,8 @@
         </p:nvSpPr>
         <p:spPr>
           <a:xfrm>
-            <a:off x="8148625" y="2958128"/>
-            <a:ext cx="1667213" cy="369460"/>
+            <a:off x="7940970" y="2958128"/>
+            <a:ext cx="2292562" cy="369460"/>
           </a:xfrm>
           <a:prstGeom prst="rect">
             <a:avLst/>

</xml_diff>

<commit_message>
Remove unused pictures and update select activity & sequence diagrams, fix some minor errors in DG as well
</commit_message>
<xml_diff>
--- a/docs/diagrams/SelectActivityDiagram.pptx
+++ b/docs/diagrams/SelectActivityDiagram.pptx
@@ -261,7 +261,7 @@
           <a:p>
             <a:fld id="{542F47FF-5056-41FF-A1F8-23A414798AA4}" type="datetimeFigureOut">
               <a:rPr lang="en-SG" smtClean="0"/>
-              <a:t>5/4/19</a:t>
+              <a:t>14/4/19</a:t>
             </a:fld>
             <a:endParaRPr lang="en-SG"/>
           </a:p>
@@ -461,7 +461,7 @@
           <a:p>
             <a:fld id="{542F47FF-5056-41FF-A1F8-23A414798AA4}" type="datetimeFigureOut">
               <a:rPr lang="en-SG" smtClean="0"/>
-              <a:t>5/4/19</a:t>
+              <a:t>14/4/19</a:t>
             </a:fld>
             <a:endParaRPr lang="en-SG"/>
           </a:p>
@@ -671,7 +671,7 @@
           <a:p>
             <a:fld id="{542F47FF-5056-41FF-A1F8-23A414798AA4}" type="datetimeFigureOut">
               <a:rPr lang="en-SG" smtClean="0"/>
-              <a:t>5/4/19</a:t>
+              <a:t>14/4/19</a:t>
             </a:fld>
             <a:endParaRPr lang="en-SG"/>
           </a:p>
@@ -871,7 +871,7 @@
           <a:p>
             <a:fld id="{542F47FF-5056-41FF-A1F8-23A414798AA4}" type="datetimeFigureOut">
               <a:rPr lang="en-SG" smtClean="0"/>
-              <a:t>5/4/19</a:t>
+              <a:t>14/4/19</a:t>
             </a:fld>
             <a:endParaRPr lang="en-SG"/>
           </a:p>
@@ -1147,7 +1147,7 @@
           <a:p>
             <a:fld id="{542F47FF-5056-41FF-A1F8-23A414798AA4}" type="datetimeFigureOut">
               <a:rPr lang="en-SG" smtClean="0"/>
-              <a:t>5/4/19</a:t>
+              <a:t>14/4/19</a:t>
             </a:fld>
             <a:endParaRPr lang="en-SG"/>
           </a:p>
@@ -1415,7 +1415,7 @@
           <a:p>
             <a:fld id="{542F47FF-5056-41FF-A1F8-23A414798AA4}" type="datetimeFigureOut">
               <a:rPr lang="en-SG" smtClean="0"/>
-              <a:t>5/4/19</a:t>
+              <a:t>14/4/19</a:t>
             </a:fld>
             <a:endParaRPr lang="en-SG"/>
           </a:p>
@@ -1830,7 +1830,7 @@
           <a:p>
             <a:fld id="{542F47FF-5056-41FF-A1F8-23A414798AA4}" type="datetimeFigureOut">
               <a:rPr lang="en-SG" smtClean="0"/>
-              <a:t>5/4/19</a:t>
+              <a:t>14/4/19</a:t>
             </a:fld>
             <a:endParaRPr lang="en-SG"/>
           </a:p>
@@ -1972,7 +1972,7 @@
           <a:p>
             <a:fld id="{542F47FF-5056-41FF-A1F8-23A414798AA4}" type="datetimeFigureOut">
               <a:rPr lang="en-SG" smtClean="0"/>
-              <a:t>5/4/19</a:t>
+              <a:t>14/4/19</a:t>
             </a:fld>
             <a:endParaRPr lang="en-SG"/>
           </a:p>
@@ -2085,7 +2085,7 @@
           <a:p>
             <a:fld id="{542F47FF-5056-41FF-A1F8-23A414798AA4}" type="datetimeFigureOut">
               <a:rPr lang="en-SG" smtClean="0"/>
-              <a:t>5/4/19</a:t>
+              <a:t>14/4/19</a:t>
             </a:fld>
             <a:endParaRPr lang="en-SG"/>
           </a:p>
@@ -2398,7 +2398,7 @@
           <a:p>
             <a:fld id="{542F47FF-5056-41FF-A1F8-23A414798AA4}" type="datetimeFigureOut">
               <a:rPr lang="en-SG" smtClean="0"/>
-              <a:t>5/4/19</a:t>
+              <a:t>14/4/19</a:t>
             </a:fld>
             <a:endParaRPr lang="en-SG"/>
           </a:p>
@@ -2687,7 +2687,7 @@
           <a:p>
             <a:fld id="{542F47FF-5056-41FF-A1F8-23A414798AA4}" type="datetimeFigureOut">
               <a:rPr lang="en-SG" smtClean="0"/>
-              <a:t>5/4/19</a:t>
+              <a:t>14/4/19</a:t>
             </a:fld>
             <a:endParaRPr lang="en-SG"/>
           </a:p>
@@ -2930,7 +2930,7 @@
           <a:p>
             <a:fld id="{542F47FF-5056-41FF-A1F8-23A414798AA4}" type="datetimeFigureOut">
               <a:rPr lang="en-SG" smtClean="0"/>
-              <a:t>5/4/19</a:t>
+              <a:t>14/4/19</a:t>
             </a:fld>
             <a:endParaRPr lang="en-SG"/>
           </a:p>
@@ -3361,8 +3361,8 @@
         </p:nvSpPr>
         <p:spPr>
           <a:xfrm>
-            <a:off x="738352" y="3648662"/>
-            <a:ext cx="235669" cy="235669"/>
+            <a:off x="-429986" y="3315932"/>
+            <a:ext cx="205792" cy="205791"/>
           </a:xfrm>
           <a:prstGeom prst="ellipse">
             <a:avLst/>
@@ -3392,7 +3392,7 @@
           <a:lstStyle/>
           <a:p>
             <a:pPr algn="ctr"/>
-            <a:endParaRPr lang="en-SG" sz="1801"/>
+            <a:endParaRPr lang="en-SG" sz="1600"/>
           </a:p>
         </p:txBody>
       </p:sp>
@@ -3414,8 +3414,8 @@
         </p:nvCxnSpPr>
         <p:spPr>
           <a:xfrm flipV="1">
-            <a:off x="974021" y="3763576"/>
-            <a:ext cx="227605" cy="2921"/>
+            <a:off x="-224194" y="3418827"/>
+            <a:ext cx="419816" cy="1"/>
           </a:xfrm>
           <a:prstGeom prst="straightConnector1">
             <a:avLst/>
@@ -3453,8 +3453,8 @@
         </p:nvSpPr>
         <p:spPr>
           <a:xfrm>
-            <a:off x="1201626" y="3440282"/>
-            <a:ext cx="1838440" cy="646588"/>
+            <a:off x="195622" y="3110800"/>
+            <a:ext cx="1646229" cy="616053"/>
           </a:xfrm>
           <a:prstGeom prst="roundRect">
             <a:avLst/>
@@ -3485,7 +3485,7 @@
           <a:p>
             <a:pPr algn="ctr"/>
             <a:r>
-              <a:rPr lang="en-SG" sz="1801" dirty="0"/>
+              <a:rPr lang="en-SG" sz="1600" dirty="0"/>
               <a:t>User executes Select command</a:t>
             </a:r>
           </a:p>
@@ -3508,9 +3508,9 @@
           <p:nvPr/>
         </p:nvCxnSpPr>
         <p:spPr>
-          <a:xfrm flipV="1">
-            <a:off x="3040066" y="3753097"/>
-            <a:ext cx="775246" cy="10479"/>
+          <a:xfrm>
+            <a:off x="1841851" y="3418827"/>
+            <a:ext cx="736180" cy="2137"/>
           </a:xfrm>
           <a:prstGeom prst="straightConnector1">
             <a:avLst/>
@@ -3536,10 +3536,87 @@
       </p:cxnSp>
       <p:sp>
         <p:nvSpPr>
-          <p:cNvPr id="46" name="Diamond 45">
-            <a:extLst>
-              <a:ext uri="{FF2B5EF4-FFF2-40B4-BE49-F238E27FC236}">
-                <a16:creationId xmlns:a16="http://schemas.microsoft.com/office/drawing/2014/main" id="{FDB4A38F-F816-4320-82EB-071E9BA2EFAB}"/>
+          <p:cNvPr id="47" name="TextBox 46">
+            <a:extLst>
+              <a:ext uri="{FF2B5EF4-FFF2-40B4-BE49-F238E27FC236}">
+                <a16:creationId xmlns:a16="http://schemas.microsoft.com/office/drawing/2014/main" id="{791A7435-1CBD-4D64-B373-CDF617409EFD}"/>
+              </a:ext>
+            </a:extLst>
+          </p:cNvPr>
+          <p:cNvSpPr txBox="1"/>
+          <p:nvPr/>
+        </p:nvSpPr>
+        <p:spPr>
+          <a:xfrm>
+            <a:off x="1689712" y="3756531"/>
+            <a:ext cx="1073048" cy="338554"/>
+          </a:xfrm>
+          <a:prstGeom prst="rect">
+            <a:avLst/>
+          </a:prstGeom>
+          <a:noFill/>
+        </p:spPr>
+        <p:txBody>
+          <a:bodyPr wrap="square" rtlCol="0">
+            <a:spAutoFit/>
+          </a:bodyPr>
+          <a:lstStyle/>
+          <a:p>
+            <a:pPr algn="r"/>
+            <a:r>
+              <a:rPr lang="en-SG" sz="1600" dirty="0"/>
+              <a:t>[else]</a:t>
+            </a:r>
+          </a:p>
+        </p:txBody>
+      </p:sp>
+      <p:sp>
+        <p:nvSpPr>
+          <p:cNvPr id="48" name="TextBox 47">
+            <a:extLst>
+              <a:ext uri="{FF2B5EF4-FFF2-40B4-BE49-F238E27FC236}">
+                <a16:creationId xmlns:a16="http://schemas.microsoft.com/office/drawing/2014/main" id="{300470AD-DA4C-4F16-91F5-E3E560CDBEFC}"/>
+              </a:ext>
+            </a:extLst>
+          </p:cNvPr>
+          <p:cNvSpPr txBox="1"/>
+          <p:nvPr/>
+        </p:nvSpPr>
+        <p:spPr>
+          <a:xfrm>
+            <a:off x="1217547" y="2567295"/>
+            <a:ext cx="1534029" cy="338554"/>
+          </a:xfrm>
+          <a:prstGeom prst="rect">
+            <a:avLst/>
+          </a:prstGeom>
+          <a:noFill/>
+        </p:spPr>
+        <p:txBody>
+          <a:bodyPr wrap="square" rtlCol="0">
+            <a:spAutoFit/>
+          </a:bodyPr>
+          <a:lstStyle/>
+          <a:p>
+            <a:pPr algn="r"/>
+            <a:r>
+              <a:rPr lang="en-SG" sz="1600" dirty="0"/>
+              <a:t>[</a:t>
+            </a:r>
+            <a:r>
+              <a:rPr lang="en-US" sz="1600" dirty="0"/>
+              <a:t>Valid index]</a:t>
+            </a:r>
+            <a:endParaRPr lang="en-SG" sz="1600" dirty="0"/>
+          </a:p>
+        </p:txBody>
+      </p:sp>
+      <p:sp>
+        <p:nvSpPr>
+          <p:cNvPr id="51" name="Rectangle: Rounded Corners 50">
+            <a:extLst>
+              <a:ext uri="{FF2B5EF4-FFF2-40B4-BE49-F238E27FC236}">
+                <a16:creationId xmlns:a16="http://schemas.microsoft.com/office/drawing/2014/main" id="{D62D81FC-C644-4602-90C8-B7974D14CA54}"/>
               </a:ext>
             </a:extLst>
           </p:cNvPr>
@@ -3548,10 +3625,10 @@
         </p:nvSpPr>
         <p:spPr>
           <a:xfrm>
-            <a:off x="7491340" y="3164912"/>
-            <a:ext cx="480766" cy="480766"/>
-          </a:xfrm>
-          <a:prstGeom prst="diamond">
+            <a:off x="1991675" y="1539295"/>
+            <a:ext cx="1592528" cy="818092"/>
+          </a:xfrm>
+          <a:prstGeom prst="roundRect">
             <a:avLst/>
           </a:prstGeom>
         </p:spPr>
@@ -3579,93 +3656,19 @@
           <a:lstStyle/>
           <a:p>
             <a:pPr algn="ctr"/>
-            <a:endParaRPr lang="en-SG" sz="1801"/>
-          </a:p>
-        </p:txBody>
-      </p:sp>
-      <p:sp>
-        <p:nvSpPr>
-          <p:cNvPr id="47" name="TextBox 46">
-            <a:extLst>
-              <a:ext uri="{FF2B5EF4-FFF2-40B4-BE49-F238E27FC236}">
-                <a16:creationId xmlns:a16="http://schemas.microsoft.com/office/drawing/2014/main" id="{791A7435-1CBD-4D64-B373-CDF617409EFD}"/>
-              </a:ext>
-            </a:extLst>
-          </p:cNvPr>
-          <p:cNvSpPr txBox="1"/>
-          <p:nvPr/>
-        </p:nvSpPr>
-        <p:spPr>
-          <a:xfrm>
-            <a:off x="2689275" y="4076219"/>
-            <a:ext cx="1228836" cy="369460"/>
-          </a:xfrm>
-          <a:prstGeom prst="rect">
-            <a:avLst/>
-          </a:prstGeom>
-          <a:noFill/>
-        </p:spPr>
-        <p:txBody>
-          <a:bodyPr wrap="square" rtlCol="0">
-            <a:spAutoFit/>
-          </a:bodyPr>
-          <a:lstStyle/>
-          <a:p>
-            <a:pPr algn="r"/>
-            <a:r>
-              <a:rPr lang="en-SG" sz="1801" dirty="0"/>
-              <a:t>[else]</a:t>
-            </a:r>
-          </a:p>
-        </p:txBody>
-      </p:sp>
-      <p:sp>
-        <p:nvSpPr>
-          <p:cNvPr id="48" name="TextBox 47">
-            <a:extLst>
-              <a:ext uri="{FF2B5EF4-FFF2-40B4-BE49-F238E27FC236}">
-                <a16:creationId xmlns:a16="http://schemas.microsoft.com/office/drawing/2014/main" id="{300470AD-DA4C-4F16-91F5-E3E560CDBEFC}"/>
-              </a:ext>
-            </a:extLst>
-          </p:cNvPr>
-          <p:cNvSpPr txBox="1"/>
-          <p:nvPr/>
-        </p:nvSpPr>
-        <p:spPr>
-          <a:xfrm>
-            <a:off x="2178760" y="2872695"/>
-            <a:ext cx="1756744" cy="369460"/>
-          </a:xfrm>
-          <a:prstGeom prst="rect">
-            <a:avLst/>
-          </a:prstGeom>
-          <a:noFill/>
-        </p:spPr>
-        <p:txBody>
-          <a:bodyPr wrap="square" rtlCol="0">
-            <a:spAutoFit/>
-          </a:bodyPr>
-          <a:lstStyle/>
-          <a:p>
-            <a:pPr algn="r"/>
-            <a:r>
-              <a:rPr lang="en-SG" sz="1801" dirty="0"/>
-              <a:t>[</a:t>
-            </a:r>
-            <a:r>
-              <a:rPr lang="en-US" dirty="0"/>
-              <a:t>Valid index]</a:t>
-            </a:r>
-            <a:endParaRPr lang="en-SG" sz="1801" dirty="0"/>
-          </a:p>
-        </p:txBody>
-      </p:sp>
-      <p:sp>
-        <p:nvSpPr>
-          <p:cNvPr id="51" name="Rectangle: Rounded Corners 50">
-            <a:extLst>
-              <a:ext uri="{FF2B5EF4-FFF2-40B4-BE49-F238E27FC236}">
-                <a16:creationId xmlns:a16="http://schemas.microsoft.com/office/drawing/2014/main" id="{D62D81FC-C644-4602-90C8-B7974D14CA54}"/>
+            <a:r>
+              <a:rPr lang="en-SG" sz="1600" dirty="0"/>
+              <a:t>Parse index and sets selected Restaurant</a:t>
+            </a:r>
+          </a:p>
+        </p:txBody>
+      </p:sp>
+      <p:sp>
+        <p:nvSpPr>
+          <p:cNvPr id="56" name="Diamond 55">
+            <a:extLst>
+              <a:ext uri="{FF2B5EF4-FFF2-40B4-BE49-F238E27FC236}">
+                <a16:creationId xmlns:a16="http://schemas.microsoft.com/office/drawing/2014/main" id="{0ACD7DC4-F31E-42B2-9D34-41B1AE997EB1}"/>
               </a:ext>
             </a:extLst>
           </p:cNvPr>
@@ -3674,10 +3677,10 @@
         </p:nvSpPr>
         <p:spPr>
           <a:xfrm>
-            <a:off x="2790875" y="1798785"/>
-            <a:ext cx="2529639" cy="814659"/>
-          </a:xfrm>
-          <a:prstGeom prst="roundRect">
+            <a:off x="2578031" y="3211056"/>
+            <a:ext cx="419816" cy="419816"/>
+          </a:xfrm>
+          <a:prstGeom prst="diamond">
             <a:avLst/>
           </a:prstGeom>
         </p:spPr>
@@ -3705,19 +3708,16 @@
           <a:lstStyle/>
           <a:p>
             <a:pPr algn="ctr"/>
-            <a:r>
-              <a:rPr lang="en-SG" sz="1801" dirty="0"/>
-              <a:t>Parse index and sets selected Restaurant</a:t>
-            </a:r>
-          </a:p>
-        </p:txBody>
-      </p:sp>
-      <p:sp>
-        <p:nvSpPr>
-          <p:cNvPr id="56" name="Diamond 55">
-            <a:extLst>
-              <a:ext uri="{FF2B5EF4-FFF2-40B4-BE49-F238E27FC236}">
-                <a16:creationId xmlns:a16="http://schemas.microsoft.com/office/drawing/2014/main" id="{0ACD7DC4-F31E-42B2-9D34-41B1AE997EB1}"/>
+            <a:endParaRPr lang="en-SG" sz="1600"/>
+          </a:p>
+        </p:txBody>
+      </p:sp>
+      <p:sp>
+        <p:nvSpPr>
+          <p:cNvPr id="28" name="Rectangle: Rounded Corners 50">
+            <a:extLst>
+              <a:ext uri="{FF2B5EF4-FFF2-40B4-BE49-F238E27FC236}">
+                <a16:creationId xmlns:a16="http://schemas.microsoft.com/office/drawing/2014/main" id="{C5F0AC9C-B85F-FC41-AA58-93786C66ECDF}"/>
               </a:ext>
             </a:extLst>
           </p:cNvPr>
@@ -3726,10 +3726,148 @@
         </p:nvSpPr>
         <p:spPr>
           <a:xfrm>
-            <a:off x="3815312" y="3512714"/>
-            <a:ext cx="480766" cy="480766"/>
-          </a:xfrm>
-          <a:prstGeom prst="diamond">
+            <a:off x="1991675" y="4338542"/>
+            <a:ext cx="1592528" cy="766637"/>
+          </a:xfrm>
+          <a:prstGeom prst="roundRect">
+            <a:avLst/>
+          </a:prstGeom>
+        </p:spPr>
+        <p:style>
+          <a:lnRef idx="1">
+            <a:schemeClr val="accent4"/>
+          </a:lnRef>
+          <a:fillRef idx="2">
+            <a:schemeClr val="accent4"/>
+          </a:fillRef>
+          <a:effectRef idx="1">
+            <a:schemeClr val="accent4"/>
+          </a:effectRef>
+          <a:fontRef idx="minor">
+            <a:schemeClr val="dk1"/>
+          </a:fontRef>
+        </p:style>
+        <p:txBody>
+          <a:bodyPr rot="0" spcFirstLastPara="0" vertOverflow="overflow" horzOverflow="overflow" vert="horz" wrap="square" lIns="91440" tIns="45721" rIns="91440" bIns="45721" numCol="1" spcCol="0" rtlCol="0" fromWordArt="0" anchor="ctr" anchorCtr="0" forceAA="0" compatLnSpc="1">
+            <a:prstTxWarp prst="textNoShape">
+              <a:avLst/>
+            </a:prstTxWarp>
+            <a:noAutofit/>
+          </a:bodyPr>
+          <a:lstStyle/>
+          <a:p>
+            <a:pPr algn="ctr"/>
+            <a:r>
+              <a:rPr lang="en-SG" sz="1600" dirty="0"/>
+              <a:t>Display invalid index error message</a:t>
+            </a:r>
+          </a:p>
+        </p:txBody>
+      </p:sp>
+      <p:cxnSp>
+        <p:nvCxnSpPr>
+          <p:cNvPr id="25" name="Straight Arrow Connector 24">
+            <a:extLst>
+              <a:ext uri="{FF2B5EF4-FFF2-40B4-BE49-F238E27FC236}">
+                <a16:creationId xmlns:a16="http://schemas.microsoft.com/office/drawing/2014/main" id="{DA29710C-7366-E244-B0FF-AC57BFEC1984}"/>
+              </a:ext>
+            </a:extLst>
+          </p:cNvPr>
+          <p:cNvCxnSpPr>
+            <a:cxnSpLocks/>
+            <a:stCxn id="56" idx="0"/>
+            <a:endCxn id="51" idx="2"/>
+          </p:cNvCxnSpPr>
+          <p:nvPr/>
+        </p:nvCxnSpPr>
+        <p:spPr>
+          <a:xfrm flipV="1">
+            <a:off x="2787939" y="2357387"/>
+            <a:ext cx="0" cy="853669"/>
+          </a:xfrm>
+          <a:prstGeom prst="straightConnector1">
+            <a:avLst/>
+          </a:prstGeom>
+          <a:ln>
+            <a:tailEnd type="triangle"/>
+          </a:ln>
+        </p:spPr>
+        <p:style>
+          <a:lnRef idx="1">
+            <a:schemeClr val="dk1"/>
+          </a:lnRef>
+          <a:fillRef idx="0">
+            <a:schemeClr val="dk1"/>
+          </a:fillRef>
+          <a:effectRef idx="0">
+            <a:schemeClr val="dk1"/>
+          </a:effectRef>
+          <a:fontRef idx="minor">
+            <a:schemeClr val="tx1"/>
+          </a:fontRef>
+        </p:style>
+      </p:cxnSp>
+      <p:cxnSp>
+        <p:nvCxnSpPr>
+          <p:cNvPr id="27" name="Straight Arrow Connector 26">
+            <a:extLst>
+              <a:ext uri="{FF2B5EF4-FFF2-40B4-BE49-F238E27FC236}">
+                <a16:creationId xmlns:a16="http://schemas.microsoft.com/office/drawing/2014/main" id="{0F14E0C9-CCDC-7F4F-BE15-20BBBB2DBFAC}"/>
+              </a:ext>
+            </a:extLst>
+          </p:cNvPr>
+          <p:cNvCxnSpPr>
+            <a:cxnSpLocks/>
+            <a:stCxn id="56" idx="2"/>
+            <a:endCxn id="28" idx="0"/>
+          </p:cNvCxnSpPr>
+          <p:nvPr/>
+        </p:nvCxnSpPr>
+        <p:spPr>
+          <a:xfrm>
+            <a:off x="2787939" y="3630872"/>
+            <a:ext cx="0" cy="707670"/>
+          </a:xfrm>
+          <a:prstGeom prst="straightConnector1">
+            <a:avLst/>
+          </a:prstGeom>
+          <a:ln>
+            <a:tailEnd type="triangle"/>
+          </a:ln>
+        </p:spPr>
+        <p:style>
+          <a:lnRef idx="1">
+            <a:schemeClr val="dk1"/>
+          </a:lnRef>
+          <a:fillRef idx="0">
+            <a:schemeClr val="dk1"/>
+          </a:fillRef>
+          <a:effectRef idx="0">
+            <a:schemeClr val="dk1"/>
+          </a:effectRef>
+          <a:fontRef idx="minor">
+            <a:schemeClr val="tx1"/>
+          </a:fontRef>
+        </p:style>
+      </p:cxnSp>
+      <p:sp>
+        <p:nvSpPr>
+          <p:cNvPr id="45" name="Rectangle: Rounded Corners 50">
+            <a:extLst>
+              <a:ext uri="{FF2B5EF4-FFF2-40B4-BE49-F238E27FC236}">
+                <a16:creationId xmlns:a16="http://schemas.microsoft.com/office/drawing/2014/main" id="{5B026FE9-3649-324D-A973-88E22AA66FF5}"/>
+              </a:ext>
+            </a:extLst>
+          </p:cNvPr>
+          <p:cNvSpPr/>
+          <p:nvPr/>
+        </p:nvSpPr>
+        <p:spPr>
+          <a:xfrm>
+            <a:off x="6894858" y="8166"/>
+            <a:ext cx="2888286" cy="787394"/>
+          </a:xfrm>
+          <a:prstGeom prst="roundRect">
             <a:avLst/>
           </a:prstGeom>
         </p:spPr>
@@ -3757,30 +3895,627 @@
           <a:lstStyle/>
           <a:p>
             <a:pPr algn="ctr"/>
-            <a:endParaRPr lang="en-SG" sz="1801"/>
+            <a:r>
+              <a:rPr lang="en-SG" sz="1600" dirty="0"/>
+              <a:t>Listener of selected Restaurant picks up new value of selected Restaurant</a:t>
+            </a:r>
           </a:p>
         </p:txBody>
       </p:sp>
       <p:cxnSp>
         <p:nvCxnSpPr>
-          <p:cNvPr id="69" name="Straight Arrow Connector 68">
-            <a:extLst>
-              <a:ext uri="{FF2B5EF4-FFF2-40B4-BE49-F238E27FC236}">
-                <a16:creationId xmlns:a16="http://schemas.microsoft.com/office/drawing/2014/main" id="{7BE2639B-14BA-4C9C-9964-899CEF3278C9}"/>
+          <p:cNvPr id="54" name="Straight Arrow Connector 53">
+            <a:extLst>
+              <a:ext uri="{FF2B5EF4-FFF2-40B4-BE49-F238E27FC236}">
+                <a16:creationId xmlns:a16="http://schemas.microsoft.com/office/drawing/2014/main" id="{CE5C5927-743A-E94A-81D8-C9EDAFD1A184}"/>
               </a:ext>
             </a:extLst>
           </p:cNvPr>
           <p:cNvCxnSpPr>
             <a:cxnSpLocks/>
-            <a:stCxn id="83" idx="2"/>
-            <a:endCxn id="68" idx="0"/>
+            <a:stCxn id="45" idx="2"/>
+            <a:endCxn id="2" idx="0"/>
           </p:cNvCxnSpPr>
           <p:nvPr/>
         </p:nvCxnSpPr>
         <p:spPr>
           <a:xfrm>
-            <a:off x="7803467" y="5994115"/>
-            <a:ext cx="0" cy="442345"/>
+            <a:off x="8339001" y="795560"/>
+            <a:ext cx="1" cy="359971"/>
+          </a:xfrm>
+          <a:prstGeom prst="straightConnector1">
+            <a:avLst/>
+          </a:prstGeom>
+          <a:ln>
+            <a:tailEnd type="triangle"/>
+          </a:ln>
+        </p:spPr>
+        <p:style>
+          <a:lnRef idx="1">
+            <a:schemeClr val="dk1"/>
+          </a:lnRef>
+          <a:fillRef idx="0">
+            <a:schemeClr val="dk1"/>
+          </a:fillRef>
+          <a:effectRef idx="0">
+            <a:schemeClr val="dk1"/>
+          </a:effectRef>
+          <a:fontRef idx="minor">
+            <a:schemeClr val="tx1"/>
+          </a:fontRef>
+        </p:style>
+      </p:cxnSp>
+      <p:cxnSp>
+        <p:nvCxnSpPr>
+          <p:cNvPr id="82" name="Elbow Connector 81">
+            <a:extLst>
+              <a:ext uri="{FF2B5EF4-FFF2-40B4-BE49-F238E27FC236}">
+                <a16:creationId xmlns:a16="http://schemas.microsoft.com/office/drawing/2014/main" id="{2EAD5B81-2347-0D4B-B145-F079E1C99619}"/>
+              </a:ext>
+            </a:extLst>
+          </p:cNvPr>
+          <p:cNvCxnSpPr>
+            <a:cxnSpLocks/>
+            <a:stCxn id="51" idx="0"/>
+            <a:endCxn id="45" idx="1"/>
+          </p:cNvCxnSpPr>
+          <p:nvPr/>
+        </p:nvCxnSpPr>
+        <p:spPr>
+          <a:xfrm rot="5400000" flipH="1" flipV="1">
+            <a:off x="4272682" y="-1082880"/>
+            <a:ext cx="1137432" cy="4106919"/>
+          </a:xfrm>
+          <a:prstGeom prst="bentConnector2">
+            <a:avLst/>
+          </a:prstGeom>
+          <a:ln>
+            <a:tailEnd type="triangle"/>
+          </a:ln>
+        </p:spPr>
+        <p:style>
+          <a:lnRef idx="1">
+            <a:schemeClr val="dk1"/>
+          </a:lnRef>
+          <a:fillRef idx="0">
+            <a:schemeClr val="dk1"/>
+          </a:fillRef>
+          <a:effectRef idx="0">
+            <a:schemeClr val="dk1"/>
+          </a:effectRef>
+          <a:fontRef idx="minor">
+            <a:schemeClr val="tx1"/>
+          </a:fontRef>
+        </p:style>
+      </p:cxnSp>
+      <p:sp>
+        <p:nvSpPr>
+          <p:cNvPr id="2" name="Rectangle 1">
+            <a:extLst>
+              <a:ext uri="{FF2B5EF4-FFF2-40B4-BE49-F238E27FC236}">
+                <a16:creationId xmlns:a16="http://schemas.microsoft.com/office/drawing/2014/main" id="{4AB26F1D-51A3-A741-BE03-D4FB55210813}"/>
+              </a:ext>
+            </a:extLst>
+          </p:cNvPr>
+          <p:cNvSpPr/>
+          <p:nvPr/>
+        </p:nvSpPr>
+        <p:spPr>
+          <a:xfrm>
+            <a:off x="6507862" y="1155531"/>
+            <a:ext cx="3662280" cy="103449"/>
+          </a:xfrm>
+          <a:prstGeom prst="rect">
+            <a:avLst/>
+          </a:prstGeom>
+        </p:spPr>
+        <p:style>
+          <a:lnRef idx="2">
+            <a:schemeClr val="dk1">
+              <a:shade val="50000"/>
+            </a:schemeClr>
+          </a:lnRef>
+          <a:fillRef idx="1">
+            <a:schemeClr val="dk1"/>
+          </a:fillRef>
+          <a:effectRef idx="0">
+            <a:schemeClr val="dk1"/>
+          </a:effectRef>
+          <a:fontRef idx="minor">
+            <a:schemeClr val="lt1"/>
+          </a:fontRef>
+        </p:style>
+        <p:txBody>
+          <a:bodyPr rtlCol="0" anchor="ctr"/>
+          <a:lstStyle/>
+          <a:p>
+            <a:pPr algn="ctr"/>
+            <a:endParaRPr lang="en-US" sz="1600"/>
+          </a:p>
+        </p:txBody>
+      </p:sp>
+      <p:sp>
+        <p:nvSpPr>
+          <p:cNvPr id="57" name="Diamond 56">
+            <a:extLst>
+              <a:ext uri="{FF2B5EF4-FFF2-40B4-BE49-F238E27FC236}">
+                <a16:creationId xmlns:a16="http://schemas.microsoft.com/office/drawing/2014/main" id="{F5A89743-9700-EA48-8D1A-F00F6FB9F3BF}"/>
+              </a:ext>
+            </a:extLst>
+          </p:cNvPr>
+          <p:cNvSpPr/>
+          <p:nvPr/>
+        </p:nvSpPr>
+        <p:spPr>
+          <a:xfrm>
+            <a:off x="5889219" y="3181621"/>
+            <a:ext cx="419816" cy="419816"/>
+          </a:xfrm>
+          <a:prstGeom prst="diamond">
+            <a:avLst/>
+          </a:prstGeom>
+        </p:spPr>
+        <p:style>
+          <a:lnRef idx="1">
+            <a:schemeClr val="accent6"/>
+          </a:lnRef>
+          <a:fillRef idx="2">
+            <a:schemeClr val="accent6"/>
+          </a:fillRef>
+          <a:effectRef idx="1">
+            <a:schemeClr val="accent6"/>
+          </a:effectRef>
+          <a:fontRef idx="minor">
+            <a:schemeClr val="dk1"/>
+          </a:fontRef>
+        </p:style>
+        <p:txBody>
+          <a:bodyPr rot="0" spcFirstLastPara="0" vertOverflow="overflow" horzOverflow="overflow" vert="horz" wrap="square" lIns="91440" tIns="45721" rIns="91440" bIns="45721" numCol="1" spcCol="0" rtlCol="0" fromWordArt="0" anchor="ctr" anchorCtr="0" forceAA="0" compatLnSpc="1">
+            <a:prstTxWarp prst="textNoShape">
+              <a:avLst/>
+            </a:prstTxWarp>
+            <a:noAutofit/>
+          </a:bodyPr>
+          <a:lstStyle/>
+          <a:p>
+            <a:pPr algn="ctr"/>
+            <a:endParaRPr lang="en-SG" sz="1600"/>
+          </a:p>
+        </p:txBody>
+      </p:sp>
+      <p:sp>
+        <p:nvSpPr>
+          <p:cNvPr id="64" name="Rectangle: Rounded Corners 50">
+            <a:extLst>
+              <a:ext uri="{FF2B5EF4-FFF2-40B4-BE49-F238E27FC236}">
+                <a16:creationId xmlns:a16="http://schemas.microsoft.com/office/drawing/2014/main" id="{D5678540-552D-AB43-B701-B6439471C917}"/>
+              </a:ext>
+            </a:extLst>
+          </p:cNvPr>
+          <p:cNvSpPr/>
+          <p:nvPr/>
+        </p:nvSpPr>
+        <p:spPr>
+          <a:xfrm>
+            <a:off x="5320983" y="1894146"/>
+            <a:ext cx="1556288" cy="818092"/>
+          </a:xfrm>
+          <a:prstGeom prst="roundRect">
+            <a:avLst/>
+          </a:prstGeom>
+        </p:spPr>
+        <p:style>
+          <a:lnRef idx="1">
+            <a:schemeClr val="accent6"/>
+          </a:lnRef>
+          <a:fillRef idx="2">
+            <a:schemeClr val="accent6"/>
+          </a:fillRef>
+          <a:effectRef idx="1">
+            <a:schemeClr val="accent6"/>
+          </a:effectRef>
+          <a:fontRef idx="minor">
+            <a:schemeClr val="dk1"/>
+          </a:fontRef>
+        </p:style>
+        <p:txBody>
+          <a:bodyPr rot="0" spcFirstLastPara="0" vertOverflow="overflow" horzOverflow="overflow" vert="horz" wrap="square" lIns="91440" tIns="45721" rIns="91440" bIns="45721" numCol="1" spcCol="0" rtlCol="0" fromWordArt="0" anchor="ctr" anchorCtr="0" forceAA="0" compatLnSpc="1">
+            <a:prstTxWarp prst="textNoShape">
+              <a:avLst/>
+            </a:prstTxWarp>
+            <a:noAutofit/>
+          </a:bodyPr>
+          <a:lstStyle/>
+          <a:p>
+            <a:pPr algn="ctr"/>
+            <a:r>
+              <a:rPr lang="en-SG" sz="1600" dirty="0"/>
+              <a:t>Loads selected Restaurant’s list of Reviews</a:t>
+            </a:r>
+          </a:p>
+        </p:txBody>
+      </p:sp>
+      <p:cxnSp>
+        <p:nvCxnSpPr>
+          <p:cNvPr id="65" name="Elbow Connector 64">
+            <a:extLst>
+              <a:ext uri="{FF2B5EF4-FFF2-40B4-BE49-F238E27FC236}">
+                <a16:creationId xmlns:a16="http://schemas.microsoft.com/office/drawing/2014/main" id="{3C28AC9B-1933-444F-B08D-09FCD873A2C2}"/>
+              </a:ext>
+            </a:extLst>
+          </p:cNvPr>
+          <p:cNvCxnSpPr>
+            <a:cxnSpLocks/>
+            <a:stCxn id="57" idx="1"/>
+            <a:endCxn id="66" idx="0"/>
+          </p:cNvCxnSpPr>
+          <p:nvPr/>
+        </p:nvCxnSpPr>
+        <p:spPr>
+          <a:xfrm rot="10800000" flipV="1">
+            <a:off x="4849709" y="3391529"/>
+            <a:ext cx="1039511" cy="488156"/>
+          </a:xfrm>
+          <a:prstGeom prst="bentConnector2">
+            <a:avLst/>
+          </a:prstGeom>
+          <a:ln>
+            <a:tailEnd type="triangle"/>
+          </a:ln>
+        </p:spPr>
+        <p:style>
+          <a:lnRef idx="1">
+            <a:schemeClr val="dk1"/>
+          </a:lnRef>
+          <a:fillRef idx="0">
+            <a:schemeClr val="dk1"/>
+          </a:fillRef>
+          <a:effectRef idx="0">
+            <a:schemeClr val="dk1"/>
+          </a:effectRef>
+          <a:fontRef idx="minor">
+            <a:schemeClr val="tx1"/>
+          </a:fontRef>
+        </p:style>
+      </p:cxnSp>
+      <p:sp>
+        <p:nvSpPr>
+          <p:cNvPr id="66" name="Rectangle: Rounded Corners 50">
+            <a:extLst>
+              <a:ext uri="{FF2B5EF4-FFF2-40B4-BE49-F238E27FC236}">
+                <a16:creationId xmlns:a16="http://schemas.microsoft.com/office/drawing/2014/main" id="{16D3ABD9-5A0A-D14E-82AD-CCE5B22FA1FE}"/>
+              </a:ext>
+            </a:extLst>
+          </p:cNvPr>
+          <p:cNvSpPr/>
+          <p:nvPr/>
+        </p:nvSpPr>
+        <p:spPr>
+          <a:xfrm>
+            <a:off x="4049052" y="3879685"/>
+            <a:ext cx="1601312" cy="766637"/>
+          </a:xfrm>
+          <a:prstGeom prst="roundRect">
+            <a:avLst/>
+          </a:prstGeom>
+        </p:spPr>
+        <p:style>
+          <a:lnRef idx="1">
+            <a:schemeClr val="accent4"/>
+          </a:lnRef>
+          <a:fillRef idx="2">
+            <a:schemeClr val="accent4"/>
+          </a:fillRef>
+          <a:effectRef idx="1">
+            <a:schemeClr val="accent4"/>
+          </a:effectRef>
+          <a:fontRef idx="minor">
+            <a:schemeClr val="dk1"/>
+          </a:fontRef>
+        </p:style>
+        <p:txBody>
+          <a:bodyPr rot="0" spcFirstLastPara="0" vertOverflow="overflow" horzOverflow="overflow" vert="horz" wrap="square" lIns="91440" tIns="45721" rIns="91440" bIns="45721" numCol="1" spcCol="0" rtlCol="0" fromWordArt="0" anchor="ctr" anchorCtr="0" forceAA="0" compatLnSpc="1">
+            <a:prstTxWarp prst="textNoShape">
+              <a:avLst/>
+            </a:prstTxWarp>
+            <a:noAutofit/>
+          </a:bodyPr>
+          <a:lstStyle/>
+          <a:p>
+            <a:pPr algn="ctr"/>
+            <a:r>
+              <a:rPr lang="en-SG" sz="1600" dirty="0"/>
+              <a:t>Display Restaurant’s list of Reviews</a:t>
+            </a:r>
+          </a:p>
+        </p:txBody>
+      </p:sp>
+      <p:cxnSp>
+        <p:nvCxnSpPr>
+          <p:cNvPr id="72" name="Elbow Connector 71">
+            <a:extLst>
+              <a:ext uri="{FF2B5EF4-FFF2-40B4-BE49-F238E27FC236}">
+                <a16:creationId xmlns:a16="http://schemas.microsoft.com/office/drawing/2014/main" id="{E98484CB-1451-B742-8C84-EBDD6DB22345}"/>
+              </a:ext>
+            </a:extLst>
+          </p:cNvPr>
+          <p:cNvCxnSpPr>
+            <a:cxnSpLocks/>
+            <a:stCxn id="57" idx="3"/>
+            <a:endCxn id="79" idx="0"/>
+          </p:cNvCxnSpPr>
+          <p:nvPr/>
+        </p:nvCxnSpPr>
+        <p:spPr>
+          <a:xfrm>
+            <a:off x="6309035" y="3391529"/>
+            <a:ext cx="970759" cy="488156"/>
+          </a:xfrm>
+          <a:prstGeom prst="bentConnector2">
+            <a:avLst/>
+          </a:prstGeom>
+          <a:ln>
+            <a:tailEnd type="triangle"/>
+          </a:ln>
+        </p:spPr>
+        <p:style>
+          <a:lnRef idx="1">
+            <a:schemeClr val="dk1"/>
+          </a:lnRef>
+          <a:fillRef idx="0">
+            <a:schemeClr val="dk1"/>
+          </a:fillRef>
+          <a:effectRef idx="0">
+            <a:schemeClr val="dk1"/>
+          </a:effectRef>
+          <a:fontRef idx="minor">
+            <a:schemeClr val="tx1"/>
+          </a:fontRef>
+        </p:style>
+      </p:cxnSp>
+      <p:sp>
+        <p:nvSpPr>
+          <p:cNvPr id="73" name="TextBox 72">
+            <a:extLst>
+              <a:ext uri="{FF2B5EF4-FFF2-40B4-BE49-F238E27FC236}">
+                <a16:creationId xmlns:a16="http://schemas.microsoft.com/office/drawing/2014/main" id="{0F2B2081-3B7F-4D43-9512-0EA3FB5FEB22}"/>
+              </a:ext>
+            </a:extLst>
+          </p:cNvPr>
+          <p:cNvSpPr txBox="1"/>
+          <p:nvPr/>
+        </p:nvSpPr>
+        <p:spPr>
+          <a:xfrm>
+            <a:off x="6442870" y="2967346"/>
+            <a:ext cx="882538" cy="338554"/>
+          </a:xfrm>
+          <a:prstGeom prst="rect">
+            <a:avLst/>
+          </a:prstGeom>
+          <a:noFill/>
+        </p:spPr>
+        <p:txBody>
+          <a:bodyPr wrap="square" rtlCol="0">
+            <a:spAutoFit/>
+          </a:bodyPr>
+          <a:lstStyle/>
+          <a:p>
+            <a:r>
+              <a:rPr lang="en-US" sz="1600" dirty="0"/>
+              <a:t>[else]</a:t>
+            </a:r>
+            <a:endParaRPr lang="en-SG" sz="1600" dirty="0"/>
+          </a:p>
+        </p:txBody>
+      </p:sp>
+      <p:sp>
+        <p:nvSpPr>
+          <p:cNvPr id="79" name="Rectangle: Rounded Corners 50">
+            <a:extLst>
+              <a:ext uri="{FF2B5EF4-FFF2-40B4-BE49-F238E27FC236}">
+                <a16:creationId xmlns:a16="http://schemas.microsoft.com/office/drawing/2014/main" id="{52F78A72-2CE1-E94A-9806-A86EC3069FE4}"/>
+              </a:ext>
+            </a:extLst>
+          </p:cNvPr>
+          <p:cNvSpPr/>
+          <p:nvPr/>
+        </p:nvSpPr>
+        <p:spPr>
+          <a:xfrm>
+            <a:off x="6341885" y="3879685"/>
+            <a:ext cx="1875818" cy="766637"/>
+          </a:xfrm>
+          <a:prstGeom prst="roundRect">
+            <a:avLst/>
+          </a:prstGeom>
+        </p:spPr>
+        <p:style>
+          <a:lnRef idx="1">
+            <a:schemeClr val="accent4"/>
+          </a:lnRef>
+          <a:fillRef idx="2">
+            <a:schemeClr val="accent4"/>
+          </a:fillRef>
+          <a:effectRef idx="1">
+            <a:schemeClr val="accent4"/>
+          </a:effectRef>
+          <a:fontRef idx="minor">
+            <a:schemeClr val="dk1"/>
+          </a:fontRef>
+        </p:style>
+        <p:txBody>
+          <a:bodyPr rot="0" spcFirstLastPara="0" vertOverflow="overflow" horzOverflow="overflow" vert="horz" wrap="square" lIns="91440" tIns="45721" rIns="91440" bIns="45721" numCol="1" spcCol="0" rtlCol="0" fromWordArt="0" anchor="ctr" anchorCtr="0" forceAA="0" compatLnSpc="1">
+            <a:prstTxWarp prst="textNoShape">
+              <a:avLst/>
+            </a:prstTxWarp>
+            <a:noAutofit/>
+          </a:bodyPr>
+          <a:lstStyle/>
+          <a:p>
+            <a:pPr algn="ctr"/>
+            <a:r>
+              <a:rPr lang="en-SG" sz="1600" dirty="0"/>
+              <a:t>Display placeholder for Review List Panel</a:t>
+            </a:r>
+          </a:p>
+        </p:txBody>
+      </p:sp>
+      <p:sp>
+        <p:nvSpPr>
+          <p:cNvPr id="80" name="Diamond 79">
+            <a:extLst>
+              <a:ext uri="{FF2B5EF4-FFF2-40B4-BE49-F238E27FC236}">
+                <a16:creationId xmlns:a16="http://schemas.microsoft.com/office/drawing/2014/main" id="{77FD2DBF-007A-BA4F-B23E-1F4C32731301}"/>
+              </a:ext>
+            </a:extLst>
+          </p:cNvPr>
+          <p:cNvSpPr/>
+          <p:nvPr/>
+        </p:nvSpPr>
+        <p:spPr>
+          <a:xfrm>
+            <a:off x="5876094" y="5103738"/>
+            <a:ext cx="419816" cy="419816"/>
+          </a:xfrm>
+          <a:prstGeom prst="diamond">
+            <a:avLst/>
+          </a:prstGeom>
+        </p:spPr>
+        <p:style>
+          <a:lnRef idx="1">
+            <a:schemeClr val="accent6"/>
+          </a:lnRef>
+          <a:fillRef idx="2">
+            <a:schemeClr val="accent6"/>
+          </a:fillRef>
+          <a:effectRef idx="1">
+            <a:schemeClr val="accent6"/>
+          </a:effectRef>
+          <a:fontRef idx="minor">
+            <a:schemeClr val="dk1"/>
+          </a:fontRef>
+        </p:style>
+        <p:txBody>
+          <a:bodyPr rot="0" spcFirstLastPara="0" vertOverflow="overflow" horzOverflow="overflow" vert="horz" wrap="square" lIns="91440" tIns="45721" rIns="91440" bIns="45721" numCol="1" spcCol="0" rtlCol="0" fromWordArt="0" anchor="ctr" anchorCtr="0" forceAA="0" compatLnSpc="1">
+            <a:prstTxWarp prst="textNoShape">
+              <a:avLst/>
+            </a:prstTxWarp>
+            <a:noAutofit/>
+          </a:bodyPr>
+          <a:lstStyle/>
+          <a:p>
+            <a:pPr algn="ctr"/>
+            <a:endParaRPr lang="en-SG" sz="1600"/>
+          </a:p>
+        </p:txBody>
+      </p:sp>
+      <p:sp>
+        <p:nvSpPr>
+          <p:cNvPr id="87" name="TextBox 86">
+            <a:extLst>
+              <a:ext uri="{FF2B5EF4-FFF2-40B4-BE49-F238E27FC236}">
+                <a16:creationId xmlns:a16="http://schemas.microsoft.com/office/drawing/2014/main" id="{C578ED17-782B-EE4C-809A-6114FCBC0582}"/>
+              </a:ext>
+            </a:extLst>
+          </p:cNvPr>
+          <p:cNvSpPr txBox="1"/>
+          <p:nvPr/>
+        </p:nvSpPr>
+        <p:spPr>
+          <a:xfrm>
+            <a:off x="2877085" y="2967347"/>
+            <a:ext cx="2959173" cy="345246"/>
+          </a:xfrm>
+          <a:prstGeom prst="rect">
+            <a:avLst/>
+          </a:prstGeom>
+          <a:noFill/>
+        </p:spPr>
+        <p:txBody>
+          <a:bodyPr wrap="square" rtlCol="0">
+            <a:spAutoFit/>
+          </a:bodyPr>
+          <a:lstStyle/>
+          <a:p>
+            <a:pPr algn="r"/>
+            <a:r>
+              <a:rPr lang="en-US" sz="1600" dirty="0"/>
+              <a:t>[Review List is not empty]</a:t>
+            </a:r>
+            <a:endParaRPr lang="en-SG" sz="1600" dirty="0"/>
+          </a:p>
+        </p:txBody>
+      </p:sp>
+      <p:sp>
+        <p:nvSpPr>
+          <p:cNvPr id="88" name="Diamond 87">
+            <a:extLst>
+              <a:ext uri="{FF2B5EF4-FFF2-40B4-BE49-F238E27FC236}">
+                <a16:creationId xmlns:a16="http://schemas.microsoft.com/office/drawing/2014/main" id="{EE1E8602-89DD-BB48-BF15-C363D0D5C8BB}"/>
+              </a:ext>
+            </a:extLst>
+          </p:cNvPr>
+          <p:cNvSpPr/>
+          <p:nvPr/>
+        </p:nvSpPr>
+        <p:spPr>
+          <a:xfrm>
+            <a:off x="10494167" y="3181621"/>
+            <a:ext cx="419816" cy="419816"/>
+          </a:xfrm>
+          <a:prstGeom prst="diamond">
+            <a:avLst/>
+          </a:prstGeom>
+        </p:spPr>
+        <p:style>
+          <a:lnRef idx="1">
+            <a:schemeClr val="accent6"/>
+          </a:lnRef>
+          <a:fillRef idx="2">
+            <a:schemeClr val="accent6"/>
+          </a:fillRef>
+          <a:effectRef idx="1">
+            <a:schemeClr val="accent6"/>
+          </a:effectRef>
+          <a:fontRef idx="minor">
+            <a:schemeClr val="dk1"/>
+          </a:fontRef>
+        </p:style>
+        <p:txBody>
+          <a:bodyPr rot="0" spcFirstLastPara="0" vertOverflow="overflow" horzOverflow="overflow" vert="horz" wrap="square" lIns="91440" tIns="45721" rIns="91440" bIns="45721" numCol="1" spcCol="0" rtlCol="0" fromWordArt="0" anchor="ctr" anchorCtr="0" forceAA="0" compatLnSpc="1">
+            <a:prstTxWarp prst="textNoShape">
+              <a:avLst/>
+            </a:prstTxWarp>
+            <a:noAutofit/>
+          </a:bodyPr>
+          <a:lstStyle/>
+          <a:p>
+            <a:pPr algn="ctr"/>
+            <a:endParaRPr lang="en-SG" sz="1600"/>
+          </a:p>
+        </p:txBody>
+      </p:sp>
+      <p:cxnSp>
+        <p:nvCxnSpPr>
+          <p:cNvPr id="89" name="Straight Arrow Connector 88">
+            <a:extLst>
+              <a:ext uri="{FF2B5EF4-FFF2-40B4-BE49-F238E27FC236}">
+                <a16:creationId xmlns:a16="http://schemas.microsoft.com/office/drawing/2014/main" id="{02AEA69B-4741-7F42-A07F-1EB544D7DA00}"/>
+              </a:ext>
+            </a:extLst>
+          </p:cNvPr>
+          <p:cNvCxnSpPr>
+            <a:cxnSpLocks/>
+            <a:stCxn id="121" idx="2"/>
+            <a:endCxn id="91" idx="0"/>
+          </p:cNvCxnSpPr>
+          <p:nvPr/>
+        </p:nvCxnSpPr>
+        <p:spPr>
+          <a:xfrm flipH="1">
+            <a:off x="8318500" y="6122750"/>
+            <a:ext cx="960" cy="505526"/>
           </a:xfrm>
           <a:prstGeom prst="straightConnector1">
             <a:avLst/>
@@ -3806,10 +4541,10 @@
       </p:cxnSp>
       <p:grpSp>
         <p:nvGrpSpPr>
-          <p:cNvPr id="75" name="Group 74">
-            <a:extLst>
-              <a:ext uri="{FF2B5EF4-FFF2-40B4-BE49-F238E27FC236}">
-                <a16:creationId xmlns:a16="http://schemas.microsoft.com/office/drawing/2014/main" id="{A48F4168-7D41-4ED6-97F1-58289DDE3C4D}"/>
+          <p:cNvPr id="90" name="Group 89">
+            <a:extLst>
+              <a:ext uri="{FF2B5EF4-FFF2-40B4-BE49-F238E27FC236}">
+                <a16:creationId xmlns:a16="http://schemas.microsoft.com/office/drawing/2014/main" id="{13DF05D2-B9E1-5047-9FE4-872C6A9B1760}"/>
               </a:ext>
             </a:extLst>
           </p:cNvPr>
@@ -3818,18 +4553,18 @@
         </p:nvGrpSpPr>
         <p:grpSpPr>
           <a:xfrm>
-            <a:off x="7685632" y="6436460"/>
-            <a:ext cx="235669" cy="235669"/>
+            <a:off x="8215604" y="6628276"/>
+            <a:ext cx="205792" cy="205792"/>
             <a:chOff x="8040730" y="5082186"/>
             <a:chExt cx="235669" cy="235669"/>
           </a:xfrm>
         </p:grpSpPr>
         <p:sp>
           <p:nvSpPr>
-            <p:cNvPr id="68" name="Oval 67">
+            <p:cNvPr id="91" name="Oval 90">
               <a:extLst>
                 <a:ext uri="{FF2B5EF4-FFF2-40B4-BE49-F238E27FC236}">
-                  <a16:creationId xmlns:a16="http://schemas.microsoft.com/office/drawing/2014/main" id="{E423C8D7-553D-4A16-BA68-78DB113CAEC3}"/>
+                  <a16:creationId xmlns:a16="http://schemas.microsoft.com/office/drawing/2014/main" id="{3D639A96-DDC9-E648-8F39-3D801E9E9755}"/>
                 </a:ext>
               </a:extLst>
             </p:cNvPr>
@@ -3872,16 +4607,16 @@
             <a:lstStyle/>
             <a:p>
               <a:pPr algn="ctr"/>
-              <a:endParaRPr lang="en-SG" sz="1801"/>
+              <a:endParaRPr lang="en-SG" sz="1600"/>
             </a:p>
           </p:txBody>
         </p:sp>
         <p:sp>
           <p:nvSpPr>
-            <p:cNvPr id="71" name="Oval 70">
+            <p:cNvPr id="92" name="Oval 91">
               <a:extLst>
                 <a:ext uri="{FF2B5EF4-FFF2-40B4-BE49-F238E27FC236}">
-                  <a16:creationId xmlns:a16="http://schemas.microsoft.com/office/drawing/2014/main" id="{1F41AA13-1BFC-498E-BBC4-DC32053E38E1}"/>
+                  <a16:creationId xmlns:a16="http://schemas.microsoft.com/office/drawing/2014/main" id="{08F6B2EB-ECF2-8C49-81C8-73FEB4553A1C}"/>
                 </a:ext>
               </a:extLst>
             </p:cNvPr>
@@ -3921,30 +4656,86 @@
             <a:lstStyle/>
             <a:p>
               <a:pPr algn="ctr"/>
-              <a:endParaRPr lang="en-SG" sz="1801"/>
+              <a:endParaRPr lang="en-SG" sz="1600"/>
             </a:p>
           </p:txBody>
         </p:sp>
       </p:grpSp>
+      <p:sp>
+        <p:nvSpPr>
+          <p:cNvPr id="94" name="Rectangle: Rounded Corners 50">
+            <a:extLst>
+              <a:ext uri="{FF2B5EF4-FFF2-40B4-BE49-F238E27FC236}">
+                <a16:creationId xmlns:a16="http://schemas.microsoft.com/office/drawing/2014/main" id="{E74B9F8F-0148-C445-AA88-12F274B197F5}"/>
+              </a:ext>
+            </a:extLst>
+          </p:cNvPr>
+          <p:cNvSpPr/>
+          <p:nvPr/>
+        </p:nvSpPr>
+        <p:spPr>
+          <a:xfrm>
+            <a:off x="9859706" y="1894328"/>
+            <a:ext cx="1688737" cy="816236"/>
+          </a:xfrm>
+          <a:prstGeom prst="roundRect">
+            <a:avLst/>
+          </a:prstGeom>
+        </p:spPr>
+        <p:style>
+          <a:lnRef idx="1">
+            <a:schemeClr val="accent6"/>
+          </a:lnRef>
+          <a:fillRef idx="2">
+            <a:schemeClr val="accent6"/>
+          </a:fillRef>
+          <a:effectRef idx="1">
+            <a:schemeClr val="accent6"/>
+          </a:effectRef>
+          <a:fontRef idx="minor">
+            <a:schemeClr val="dk1"/>
+          </a:fontRef>
+        </p:style>
+        <p:txBody>
+          <a:bodyPr rot="0" spcFirstLastPara="0" vertOverflow="overflow" horzOverflow="overflow" vert="horz" wrap="square" lIns="91440" tIns="45721" rIns="91440" bIns="45721" numCol="1" spcCol="0" rtlCol="0" fromWordArt="0" anchor="ctr" anchorCtr="0" forceAA="0" compatLnSpc="1">
+            <a:prstTxWarp prst="textNoShape">
+              <a:avLst/>
+            </a:prstTxWarp>
+            <a:noAutofit/>
+          </a:bodyPr>
+          <a:lstStyle/>
+          <a:p>
+            <a:pPr algn="ctr"/>
+            <a:r>
+              <a:rPr lang="en-SG" sz="1600" dirty="0"/>
+              <a:t>Loads selected Restaurant’s Summary</a:t>
+            </a:r>
+          </a:p>
+        </p:txBody>
+      </p:sp>
       <p:cxnSp>
         <p:nvCxnSpPr>
-          <p:cNvPr id="74" name="Elbow Connector 73"/>
+          <p:cNvPr id="95" name="Elbow Connector 94">
+            <a:extLst>
+              <a:ext uri="{FF2B5EF4-FFF2-40B4-BE49-F238E27FC236}">
+                <a16:creationId xmlns:a16="http://schemas.microsoft.com/office/drawing/2014/main" id="{898E418B-630F-7F4D-8B72-F7C5F52D2938}"/>
+              </a:ext>
+            </a:extLst>
+          </p:cNvPr>
           <p:cNvCxnSpPr>
             <a:cxnSpLocks/>
-            <a:stCxn id="49" idx="2"/>
-            <a:endCxn id="46" idx="0"/>
+            <a:stCxn id="88" idx="1"/>
+            <a:endCxn id="97" idx="0"/>
           </p:cNvCxnSpPr>
           <p:nvPr/>
         </p:nvCxnSpPr>
         <p:spPr>
-          <a:xfrm rot="5400000">
-            <a:off x="7457386" y="2890573"/>
-            <a:ext cx="548677" cy="1"/>
-          </a:xfrm>
-          <a:prstGeom prst="bentConnector3">
-            <a:avLst>
-              <a:gd name="adj1" fmla="val 50000"/>
-            </a:avLst>
+          <a:xfrm rot="10800000" flipV="1">
+            <a:off x="9432505" y="3391529"/>
+            <a:ext cx="1061662" cy="323620"/>
+          </a:xfrm>
+          <a:prstGeom prst="bentConnector2">
+            <a:avLst/>
           </a:prstGeom>
           <a:ln>
             <a:tailEnd type="triangle"/>
@@ -3967,10 +4758,55 @@
       </p:cxnSp>
       <p:sp>
         <p:nvSpPr>
-          <p:cNvPr id="28" name="Rectangle: Rounded Corners 50">
-            <a:extLst>
-              <a:ext uri="{FF2B5EF4-FFF2-40B4-BE49-F238E27FC236}">
-                <a16:creationId xmlns:a16="http://schemas.microsoft.com/office/drawing/2014/main" id="{C5F0AC9C-B85F-FC41-AA58-93786C66ECDF}"/>
+          <p:cNvPr id="96" name="TextBox 95">
+            <a:extLst>
+              <a:ext uri="{FF2B5EF4-FFF2-40B4-BE49-F238E27FC236}">
+                <a16:creationId xmlns:a16="http://schemas.microsoft.com/office/drawing/2014/main" id="{CB69792C-91C7-9745-B763-76F97B2A7BB3}"/>
+              </a:ext>
+            </a:extLst>
+          </p:cNvPr>
+          <p:cNvSpPr txBox="1"/>
+          <p:nvPr/>
+        </p:nvSpPr>
+        <p:spPr>
+          <a:xfrm>
+            <a:off x="8468694" y="2974039"/>
+            <a:ext cx="1938932" cy="338554"/>
+          </a:xfrm>
+          <a:prstGeom prst="rect">
+            <a:avLst/>
+          </a:prstGeom>
+          <a:noFill/>
+        </p:spPr>
+        <p:txBody>
+          <a:bodyPr wrap="square" rtlCol="0">
+            <a:spAutoFit/>
+          </a:bodyPr>
+          <a:lstStyle/>
+          <a:p>
+            <a:pPr algn="r"/>
+            <a:r>
+              <a:rPr lang="en-US" sz="1600" dirty="0"/>
+              <a:t>[</a:t>
+            </a:r>
+            <a:r>
+              <a:rPr lang="en-US" sz="1600" dirty="0" err="1"/>
+              <a:t>TotalVisits</a:t>
+            </a:r>
+            <a:r>
+              <a:rPr lang="en-US" sz="1600" dirty="0"/>
+              <a:t> == 0]</a:t>
+            </a:r>
+            <a:endParaRPr lang="en-SG" sz="1600" dirty="0"/>
+          </a:p>
+        </p:txBody>
+      </p:sp>
+      <p:sp>
+        <p:nvSpPr>
+          <p:cNvPr id="97" name="Rectangle: Rounded Corners 50">
+            <a:extLst>
+              <a:ext uri="{FF2B5EF4-FFF2-40B4-BE49-F238E27FC236}">
+                <a16:creationId xmlns:a16="http://schemas.microsoft.com/office/drawing/2014/main" id="{CCF30096-EF74-A547-8FA3-6C891F4672B9}"/>
               </a:ext>
             </a:extLst>
           </p:cNvPr>
@@ -3979,8 +4815,8 @@
         </p:nvSpPr>
         <p:spPr>
           <a:xfrm>
-            <a:off x="2797226" y="4667974"/>
-            <a:ext cx="2529639" cy="814659"/>
+            <a:off x="8654001" y="3715149"/>
+            <a:ext cx="1557008" cy="1062920"/>
           </a:xfrm>
           <a:prstGeom prst="roundRect">
             <a:avLst/>
@@ -4011,33 +4847,34 @@
           <a:p>
             <a:pPr algn="ctr"/>
             <a:r>
-              <a:rPr lang="en-SG" sz="1801" dirty="0"/>
-              <a:t>Display invalid index error message</a:t>
+              <a:rPr lang="en-SG" sz="1600" dirty="0"/>
+              <a:t>Display Restaurant’s summary with ‘N.A.’ Ratings</a:t>
             </a:r>
           </a:p>
         </p:txBody>
       </p:sp>
       <p:cxnSp>
         <p:nvCxnSpPr>
-          <p:cNvPr id="25" name="Straight Arrow Connector 24">
-            <a:extLst>
-              <a:ext uri="{FF2B5EF4-FFF2-40B4-BE49-F238E27FC236}">
-                <a16:creationId xmlns:a16="http://schemas.microsoft.com/office/drawing/2014/main" id="{DA29710C-7366-E244-B0FF-AC57BFEC1984}"/>
+          <p:cNvPr id="98" name="Elbow Connector 97">
+            <a:extLst>
+              <a:ext uri="{FF2B5EF4-FFF2-40B4-BE49-F238E27FC236}">
+                <a16:creationId xmlns:a16="http://schemas.microsoft.com/office/drawing/2014/main" id="{AAFB9596-8E45-E448-BE06-DF8A8355176C}"/>
               </a:ext>
             </a:extLst>
           </p:cNvPr>
           <p:cNvCxnSpPr>
-            <a:stCxn id="56" idx="0"/>
-            <a:endCxn id="51" idx="2"/>
+            <a:cxnSpLocks/>
+            <a:stCxn id="88" idx="3"/>
+            <a:endCxn id="100" idx="0"/>
           </p:cNvCxnSpPr>
           <p:nvPr/>
         </p:nvCxnSpPr>
         <p:spPr>
-          <a:xfrm flipV="1">
-            <a:off x="4055695" y="2613444"/>
-            <a:ext cx="0" cy="899270"/>
-          </a:xfrm>
-          <a:prstGeom prst="straightConnector1">
+          <a:xfrm>
+            <a:off x="10913983" y="3391529"/>
+            <a:ext cx="1242617" cy="325162"/>
+          </a:xfrm>
+          <a:prstGeom prst="bentConnector2">
             <a:avLst/>
           </a:prstGeom>
           <a:ln>
@@ -4059,54 +4896,108 @@
           </a:fontRef>
         </p:style>
       </p:cxnSp>
-      <p:cxnSp>
-        <p:nvCxnSpPr>
-          <p:cNvPr id="27" name="Straight Arrow Connector 26">
-            <a:extLst>
-              <a:ext uri="{FF2B5EF4-FFF2-40B4-BE49-F238E27FC236}">
-                <a16:creationId xmlns:a16="http://schemas.microsoft.com/office/drawing/2014/main" id="{0F14E0C9-CCDC-7F4F-BE15-20BBBB2DBFAC}"/>
-              </a:ext>
-            </a:extLst>
-          </p:cNvPr>
-          <p:cNvCxnSpPr>
-            <a:stCxn id="56" idx="2"/>
-            <a:endCxn id="28" idx="0"/>
-          </p:cNvCxnSpPr>
+      <p:sp>
+        <p:nvSpPr>
+          <p:cNvPr id="99" name="TextBox 98">
+            <a:extLst>
+              <a:ext uri="{FF2B5EF4-FFF2-40B4-BE49-F238E27FC236}">
+                <a16:creationId xmlns:a16="http://schemas.microsoft.com/office/drawing/2014/main" id="{67A5D17B-283C-8C4B-AA8F-33B76731F436}"/>
+              </a:ext>
+            </a:extLst>
+          </p:cNvPr>
+          <p:cNvSpPr txBox="1"/>
           <p:nvPr/>
-        </p:nvCxnSpPr>
+        </p:nvSpPr>
         <p:spPr>
           <a:xfrm>
-            <a:off x="4055695" y="3993480"/>
-            <a:ext cx="6351" cy="674494"/>
-          </a:xfrm>
-          <a:prstGeom prst="straightConnector1">
+            <a:off x="11071907" y="2985384"/>
+            <a:ext cx="1603945" cy="338554"/>
+          </a:xfrm>
+          <a:prstGeom prst="rect">
             <a:avLst/>
           </a:prstGeom>
-          <a:ln>
-            <a:tailEnd type="triangle"/>
-          </a:ln>
+          <a:noFill/>
+        </p:spPr>
+        <p:txBody>
+          <a:bodyPr wrap="square" rtlCol="0">
+            <a:spAutoFit/>
+          </a:bodyPr>
+          <a:lstStyle/>
+          <a:p>
+            <a:r>
+              <a:rPr lang="en-US" sz="1600" dirty="0"/>
+              <a:t>[</a:t>
+            </a:r>
+            <a:r>
+              <a:rPr lang="en-US" sz="1600" dirty="0" err="1"/>
+              <a:t>TotalVisits</a:t>
+            </a:r>
+            <a:r>
+              <a:rPr lang="en-US" sz="1600" dirty="0"/>
+              <a:t> &gt; 0]</a:t>
+            </a:r>
+            <a:endParaRPr lang="en-SG" sz="1600" dirty="0"/>
+          </a:p>
+        </p:txBody>
+      </p:sp>
+      <p:sp>
+        <p:nvSpPr>
+          <p:cNvPr id="100" name="Rectangle: Rounded Corners 50">
+            <a:extLst>
+              <a:ext uri="{FF2B5EF4-FFF2-40B4-BE49-F238E27FC236}">
+                <a16:creationId xmlns:a16="http://schemas.microsoft.com/office/drawing/2014/main" id="{B06FF773-9959-F14A-A088-5EF1179AAAF2}"/>
+              </a:ext>
+            </a:extLst>
+          </p:cNvPr>
+          <p:cNvSpPr/>
+          <p:nvPr/>
+        </p:nvSpPr>
+        <p:spPr>
+          <a:xfrm>
+            <a:off x="10989513" y="3716691"/>
+            <a:ext cx="2334173" cy="1323764"/>
+          </a:xfrm>
+          <a:prstGeom prst="roundRect">
+            <a:avLst/>
+          </a:prstGeom>
         </p:spPr>
         <p:style>
           <a:lnRef idx="1">
-            <a:schemeClr val="dk1"/>
+            <a:schemeClr val="accent4"/>
           </a:lnRef>
-          <a:fillRef idx="0">
-            <a:schemeClr val="dk1"/>
+          <a:fillRef idx="2">
+            <a:schemeClr val="accent4"/>
           </a:fillRef>
-          <a:effectRef idx="0">
-            <a:schemeClr val="dk1"/>
+          <a:effectRef idx="1">
+            <a:schemeClr val="accent4"/>
           </a:effectRef>
           <a:fontRef idx="minor">
-            <a:schemeClr val="tx1"/>
+            <a:schemeClr val="dk1"/>
           </a:fontRef>
         </p:style>
-      </p:cxnSp>
-      <p:sp>
-        <p:nvSpPr>
-          <p:cNvPr id="45" name="Rectangle: Rounded Corners 50">
-            <a:extLst>
-              <a:ext uri="{FF2B5EF4-FFF2-40B4-BE49-F238E27FC236}">
-                <a16:creationId xmlns:a16="http://schemas.microsoft.com/office/drawing/2014/main" id="{5B026FE9-3649-324D-A973-88E22AA66FF5}"/>
+        <p:txBody>
+          <a:bodyPr rot="0" spcFirstLastPara="0" vertOverflow="overflow" horzOverflow="overflow" vert="horz" wrap="square" lIns="91440" tIns="45721" rIns="91440" bIns="45721" numCol="1" spcCol="0" rtlCol="0" fromWordArt="0" anchor="ctr" anchorCtr="0" forceAA="0" compatLnSpc="1">
+            <a:prstTxWarp prst="textNoShape">
+              <a:avLst/>
+            </a:prstTxWarp>
+            <a:noAutofit/>
+          </a:bodyPr>
+          <a:lstStyle/>
+          <a:p>
+            <a:pPr algn="ctr"/>
+            <a:r>
+              <a:rPr lang="en-SG" sz="1600" dirty="0"/>
+              <a:t>Display Restaurant’s summary with average Ratings calculated from all of the Restaurant’s Reviews</a:t>
+            </a:r>
+          </a:p>
+        </p:txBody>
+      </p:sp>
+      <p:sp>
+        <p:nvSpPr>
+          <p:cNvPr id="101" name="Diamond 100">
+            <a:extLst>
+              <a:ext uri="{FF2B5EF4-FFF2-40B4-BE49-F238E27FC236}">
+                <a16:creationId xmlns:a16="http://schemas.microsoft.com/office/drawing/2014/main" id="{63F88AF2-C79D-4F44-8A6C-22FB9FEB0AD5}"/>
               </a:ext>
             </a:extLst>
           </p:cNvPr>
@@ -4115,10 +5006,10 @@
         </p:nvSpPr>
         <p:spPr>
           <a:xfrm>
-            <a:off x="6326956" y="421540"/>
-            <a:ext cx="2824978" cy="814659"/>
-          </a:xfrm>
-          <a:prstGeom prst="roundRect">
+            <a:off x="10505413" y="5119504"/>
+            <a:ext cx="419816" cy="419816"/>
+          </a:xfrm>
+          <a:prstGeom prst="diamond">
             <a:avLst/>
           </a:prstGeom>
         </p:spPr>
@@ -4146,85 +5037,30 @@
           <a:lstStyle/>
           <a:p>
             <a:pPr algn="ctr"/>
-            <a:r>
-              <a:rPr lang="en-SG" sz="1801" dirty="0"/>
-              <a:t>Listener of selected Restaurant picks up new value for Restaurant</a:t>
-            </a:r>
-          </a:p>
-        </p:txBody>
-      </p:sp>
-      <p:sp>
-        <p:nvSpPr>
-          <p:cNvPr id="49" name="Rectangle: Rounded Corners 50">
-            <a:extLst>
-              <a:ext uri="{FF2B5EF4-FFF2-40B4-BE49-F238E27FC236}">
-                <a16:creationId xmlns:a16="http://schemas.microsoft.com/office/drawing/2014/main" id="{1DBE67FF-F6F5-DD40-9303-671094ABF964}"/>
-              </a:ext>
-            </a:extLst>
-          </p:cNvPr>
-          <p:cNvSpPr/>
-          <p:nvPr/>
-        </p:nvSpPr>
-        <p:spPr>
-          <a:xfrm>
-            <a:off x="6539368" y="1801576"/>
-            <a:ext cx="2384711" cy="814659"/>
-          </a:xfrm>
-          <a:prstGeom prst="roundRect">
-            <a:avLst/>
-          </a:prstGeom>
-        </p:spPr>
-        <p:style>
-          <a:lnRef idx="1">
-            <a:schemeClr val="accent6"/>
-          </a:lnRef>
-          <a:fillRef idx="2">
-            <a:schemeClr val="accent6"/>
-          </a:fillRef>
-          <a:effectRef idx="1">
-            <a:schemeClr val="accent6"/>
-          </a:effectRef>
-          <a:fontRef idx="minor">
-            <a:schemeClr val="dk1"/>
-          </a:fontRef>
-        </p:style>
-        <p:txBody>
-          <a:bodyPr rot="0" spcFirstLastPara="0" vertOverflow="overflow" horzOverflow="overflow" vert="horz" wrap="square" lIns="91440" tIns="45721" rIns="91440" bIns="45721" numCol="1" spcCol="0" rtlCol="0" fromWordArt="0" anchor="ctr" anchorCtr="0" forceAA="0" compatLnSpc="1">
-            <a:prstTxWarp prst="textNoShape">
-              <a:avLst/>
-            </a:prstTxWarp>
-            <a:noAutofit/>
-          </a:bodyPr>
-          <a:lstStyle/>
-          <a:p>
-            <a:pPr algn="ctr"/>
-            <a:r>
-              <a:rPr lang="en-SG" sz="1801" dirty="0"/>
-              <a:t>Loads new value for Restaurant’s Summary</a:t>
-            </a:r>
+            <a:endParaRPr lang="en-SG" sz="1600"/>
           </a:p>
         </p:txBody>
       </p:sp>
       <p:cxnSp>
         <p:nvCxnSpPr>
-          <p:cNvPr id="54" name="Straight Arrow Connector 53">
-            <a:extLst>
-              <a:ext uri="{FF2B5EF4-FFF2-40B4-BE49-F238E27FC236}">
-                <a16:creationId xmlns:a16="http://schemas.microsoft.com/office/drawing/2014/main" id="{CE5C5927-743A-E94A-81D8-C9EDAFD1A184}"/>
+          <p:cNvPr id="39" name="Straight Arrow Connector 38">
+            <a:extLst>
+              <a:ext uri="{FF2B5EF4-FFF2-40B4-BE49-F238E27FC236}">
+                <a16:creationId xmlns:a16="http://schemas.microsoft.com/office/drawing/2014/main" id="{317DBBAD-71F3-4142-9204-8CE361B5F9B8}"/>
               </a:ext>
             </a:extLst>
           </p:cNvPr>
           <p:cNvCxnSpPr>
             <a:cxnSpLocks/>
-            <a:stCxn id="45" idx="2"/>
-            <a:endCxn id="49" idx="0"/>
+            <a:stCxn id="64" idx="2"/>
+            <a:endCxn id="57" idx="0"/>
           </p:cNvCxnSpPr>
           <p:nvPr/>
         </p:nvCxnSpPr>
         <p:spPr>
-          <a:xfrm flipH="1">
-            <a:off x="7731724" y="1236199"/>
-            <a:ext cx="7721" cy="565377"/>
+          <a:xfrm>
+            <a:off x="6099127" y="2712238"/>
+            <a:ext cx="0" cy="469383"/>
           </a:xfrm>
           <a:prstGeom prst="straightConnector1">
             <a:avLst/>
@@ -4250,396 +5086,26 @@
       </p:cxnSp>
       <p:cxnSp>
         <p:nvCxnSpPr>
-          <p:cNvPr id="59" name="Elbow Connector 58">
-            <a:extLst>
-              <a:ext uri="{FF2B5EF4-FFF2-40B4-BE49-F238E27FC236}">
-                <a16:creationId xmlns:a16="http://schemas.microsoft.com/office/drawing/2014/main" id="{F432FFC1-9A1A-8A4A-85E1-89F1FA699A6B}"/>
+          <p:cNvPr id="41" name="Straight Arrow Connector 40">
+            <a:extLst>
+              <a:ext uri="{FF2B5EF4-FFF2-40B4-BE49-F238E27FC236}">
+                <a16:creationId xmlns:a16="http://schemas.microsoft.com/office/drawing/2014/main" id="{640596C8-009B-694A-B716-C8D1EAA77206}"/>
               </a:ext>
             </a:extLst>
           </p:cNvPr>
           <p:cNvCxnSpPr>
             <a:cxnSpLocks/>
-            <a:stCxn id="46" idx="1"/>
-            <a:endCxn id="70" idx="0"/>
+            <a:stCxn id="94" idx="2"/>
+            <a:endCxn id="88" idx="0"/>
           </p:cNvCxnSpPr>
           <p:nvPr/>
         </p:nvCxnSpPr>
         <p:spPr>
-          <a:xfrm rot="10800000" flipV="1">
-            <a:off x="6539368" y="3405294"/>
-            <a:ext cx="951972" cy="407329"/>
-          </a:xfrm>
-          <a:prstGeom prst="bentConnector2">
-            <a:avLst/>
-          </a:prstGeom>
-          <a:ln>
-            <a:tailEnd type="triangle"/>
-          </a:ln>
-        </p:spPr>
-        <p:style>
-          <a:lnRef idx="1">
-            <a:schemeClr val="dk1"/>
-          </a:lnRef>
-          <a:fillRef idx="0">
-            <a:schemeClr val="dk1"/>
-          </a:fillRef>
-          <a:effectRef idx="0">
-            <a:schemeClr val="dk1"/>
-          </a:effectRef>
-          <a:fontRef idx="minor">
-            <a:schemeClr val="tx1"/>
-          </a:fontRef>
-        </p:style>
-      </p:cxnSp>
-      <p:sp>
-        <p:nvSpPr>
-          <p:cNvPr id="67" name="TextBox 66">
-            <a:extLst>
-              <a:ext uri="{FF2B5EF4-FFF2-40B4-BE49-F238E27FC236}">
-                <a16:creationId xmlns:a16="http://schemas.microsoft.com/office/drawing/2014/main" id="{E2BB059B-9B8D-0849-B702-EAFFA291B413}"/>
-              </a:ext>
-            </a:extLst>
-          </p:cNvPr>
-          <p:cNvSpPr txBox="1"/>
-          <p:nvPr/>
-        </p:nvSpPr>
-        <p:spPr>
           <a:xfrm>
-            <a:off x="5007670" y="2946227"/>
-            <a:ext cx="2515606" cy="369460"/>
-          </a:xfrm>
-          <a:prstGeom prst="rect">
-            <a:avLst/>
-          </a:prstGeom>
-          <a:noFill/>
-        </p:spPr>
-        <p:txBody>
-          <a:bodyPr wrap="square" rtlCol="0">
-            <a:spAutoFit/>
-          </a:bodyPr>
-          <a:lstStyle/>
-          <a:p>
-            <a:pPr algn="r"/>
-            <a:r>
-              <a:rPr lang="en-US" sz="1801" dirty="0"/>
-              <a:t>[</a:t>
-            </a:r>
-            <a:r>
-              <a:rPr lang="en-US" sz="1801" dirty="0" err="1"/>
-              <a:t>TotalVisits</a:t>
-            </a:r>
-            <a:r>
-              <a:rPr lang="en-US" sz="1801" dirty="0"/>
-              <a:t> == 0]</a:t>
-            </a:r>
-            <a:endParaRPr lang="en-SG" sz="1801" dirty="0"/>
-          </a:p>
-        </p:txBody>
-      </p:sp>
-      <p:sp>
-        <p:nvSpPr>
-          <p:cNvPr id="70" name="Rectangle: Rounded Corners 50">
-            <a:extLst>
-              <a:ext uri="{FF2B5EF4-FFF2-40B4-BE49-F238E27FC236}">
-                <a16:creationId xmlns:a16="http://schemas.microsoft.com/office/drawing/2014/main" id="{E4B30AC4-D0AD-2342-A7C2-AA9660127F49}"/>
-              </a:ext>
-            </a:extLst>
-          </p:cNvPr>
-          <p:cNvSpPr/>
-          <p:nvPr/>
-        </p:nvSpPr>
-        <p:spPr>
-          <a:xfrm>
-            <a:off x="5506046" y="3812624"/>
-            <a:ext cx="2066644" cy="725510"/>
-          </a:xfrm>
-          <a:prstGeom prst="roundRect">
-            <a:avLst/>
-          </a:prstGeom>
-        </p:spPr>
-        <p:style>
-          <a:lnRef idx="1">
-            <a:schemeClr val="accent4"/>
-          </a:lnRef>
-          <a:fillRef idx="2">
-            <a:schemeClr val="accent4"/>
-          </a:fillRef>
-          <a:effectRef idx="1">
-            <a:schemeClr val="accent4"/>
-          </a:effectRef>
-          <a:fontRef idx="minor">
-            <a:schemeClr val="dk1"/>
-          </a:fontRef>
-        </p:style>
-        <p:txBody>
-          <a:bodyPr rot="0" spcFirstLastPara="0" vertOverflow="overflow" horzOverflow="overflow" vert="horz" wrap="square" lIns="91440" tIns="45721" rIns="91440" bIns="45721" numCol="1" spcCol="0" rtlCol="0" fromWordArt="0" anchor="ctr" anchorCtr="0" forceAA="0" compatLnSpc="1">
-            <a:prstTxWarp prst="textNoShape">
-              <a:avLst/>
-            </a:prstTxWarp>
-            <a:noAutofit/>
-          </a:bodyPr>
-          <a:lstStyle/>
-          <a:p>
-            <a:pPr algn="ctr"/>
-            <a:r>
-              <a:rPr lang="en-SG" sz="1801" dirty="0"/>
-              <a:t>Display summary with ‘N.A.’ Ratings</a:t>
-            </a:r>
-          </a:p>
-        </p:txBody>
-      </p:sp>
-      <p:cxnSp>
-        <p:nvCxnSpPr>
-          <p:cNvPr id="76" name="Elbow Connector 75">
-            <a:extLst>
-              <a:ext uri="{FF2B5EF4-FFF2-40B4-BE49-F238E27FC236}">
-                <a16:creationId xmlns:a16="http://schemas.microsoft.com/office/drawing/2014/main" id="{12B3AB34-10CB-0247-A586-556657776BCF}"/>
-              </a:ext>
-            </a:extLst>
-          </p:cNvPr>
-          <p:cNvCxnSpPr>
-            <a:cxnSpLocks/>
-            <a:stCxn id="46" idx="3"/>
-            <a:endCxn id="78" idx="0"/>
-          </p:cNvCxnSpPr>
-          <p:nvPr/>
-        </p:nvCxnSpPr>
-        <p:spPr>
-          <a:xfrm>
-            <a:off x="7972106" y="3405295"/>
-            <a:ext cx="1066195" cy="407328"/>
-          </a:xfrm>
-          <a:prstGeom prst="bentConnector2">
-            <a:avLst/>
-          </a:prstGeom>
-          <a:ln>
-            <a:tailEnd type="triangle"/>
-          </a:ln>
-        </p:spPr>
-        <p:style>
-          <a:lnRef idx="1">
-            <a:schemeClr val="dk1"/>
-          </a:lnRef>
-          <a:fillRef idx="0">
-            <a:schemeClr val="dk1"/>
-          </a:fillRef>
-          <a:effectRef idx="0">
-            <a:schemeClr val="dk1"/>
-          </a:effectRef>
-          <a:fontRef idx="minor">
-            <a:schemeClr val="tx1"/>
-          </a:fontRef>
-        </p:style>
-      </p:cxnSp>
-      <p:sp>
-        <p:nvSpPr>
-          <p:cNvPr id="77" name="TextBox 76">
-            <a:extLst>
-              <a:ext uri="{FF2B5EF4-FFF2-40B4-BE49-F238E27FC236}">
-                <a16:creationId xmlns:a16="http://schemas.microsoft.com/office/drawing/2014/main" id="{C25B84A3-B58F-E941-B947-604773895338}"/>
-              </a:ext>
-            </a:extLst>
-          </p:cNvPr>
-          <p:cNvSpPr txBox="1"/>
-          <p:nvPr/>
-        </p:nvSpPr>
-        <p:spPr>
-          <a:xfrm>
-            <a:off x="7940970" y="2958128"/>
-            <a:ext cx="2292562" cy="369460"/>
-          </a:xfrm>
-          <a:prstGeom prst="rect">
-            <a:avLst/>
-          </a:prstGeom>
-          <a:noFill/>
-        </p:spPr>
-        <p:txBody>
-          <a:bodyPr wrap="square" rtlCol="0">
-            <a:spAutoFit/>
-          </a:bodyPr>
-          <a:lstStyle/>
-          <a:p>
-            <a:r>
-              <a:rPr lang="en-US" sz="1801" dirty="0"/>
-              <a:t>[</a:t>
-            </a:r>
-            <a:r>
-              <a:rPr lang="en-US" sz="1801" dirty="0" err="1"/>
-              <a:t>TotalVisits</a:t>
-            </a:r>
-            <a:r>
-              <a:rPr lang="en-US" sz="1801" dirty="0"/>
-              <a:t> &gt; 0]</a:t>
-            </a:r>
-            <a:endParaRPr lang="en-SG" sz="1801" dirty="0"/>
-          </a:p>
-        </p:txBody>
-      </p:sp>
-      <p:sp>
-        <p:nvSpPr>
-          <p:cNvPr id="78" name="Rectangle: Rounded Corners 50">
-            <a:extLst>
-              <a:ext uri="{FF2B5EF4-FFF2-40B4-BE49-F238E27FC236}">
-                <a16:creationId xmlns:a16="http://schemas.microsoft.com/office/drawing/2014/main" id="{A6D4D4A5-04C0-0242-ADC4-93F69B9A3AA4}"/>
-              </a:ext>
-            </a:extLst>
-          </p:cNvPr>
-          <p:cNvSpPr/>
-          <p:nvPr/>
-        </p:nvSpPr>
-        <p:spPr>
-          <a:xfrm>
-            <a:off x="8004979" y="3812623"/>
-            <a:ext cx="2066644" cy="1253743"/>
-          </a:xfrm>
-          <a:prstGeom prst="roundRect">
-            <a:avLst/>
-          </a:prstGeom>
-        </p:spPr>
-        <p:style>
-          <a:lnRef idx="1">
-            <a:schemeClr val="accent4"/>
-          </a:lnRef>
-          <a:fillRef idx="2">
-            <a:schemeClr val="accent4"/>
-          </a:fillRef>
-          <a:effectRef idx="1">
-            <a:schemeClr val="accent4"/>
-          </a:effectRef>
-          <a:fontRef idx="minor">
-            <a:schemeClr val="dk1"/>
-          </a:fontRef>
-        </p:style>
-        <p:txBody>
-          <a:bodyPr rot="0" spcFirstLastPara="0" vertOverflow="overflow" horzOverflow="overflow" vert="horz" wrap="square" lIns="91440" tIns="45721" rIns="91440" bIns="45721" numCol="1" spcCol="0" rtlCol="0" fromWordArt="0" anchor="ctr" anchorCtr="0" forceAA="0" compatLnSpc="1">
-            <a:prstTxWarp prst="textNoShape">
-              <a:avLst/>
-            </a:prstTxWarp>
-            <a:noAutofit/>
-          </a:bodyPr>
-          <a:lstStyle/>
-          <a:p>
-            <a:pPr algn="ctr"/>
-            <a:r>
-              <a:rPr lang="en-SG" sz="1801" dirty="0"/>
-              <a:t>Display summary with average Ratings calculated from all Reviews</a:t>
-            </a:r>
-          </a:p>
-        </p:txBody>
-      </p:sp>
-      <p:cxnSp>
-        <p:nvCxnSpPr>
-          <p:cNvPr id="82" name="Elbow Connector 81">
-            <a:extLst>
-              <a:ext uri="{FF2B5EF4-FFF2-40B4-BE49-F238E27FC236}">
-                <a16:creationId xmlns:a16="http://schemas.microsoft.com/office/drawing/2014/main" id="{2EAD5B81-2347-0D4B-B145-F079E1C99619}"/>
-              </a:ext>
-            </a:extLst>
-          </p:cNvPr>
-          <p:cNvCxnSpPr>
-            <a:stCxn id="51" idx="0"/>
-            <a:endCxn id="45" idx="1"/>
-          </p:cNvCxnSpPr>
-          <p:nvPr/>
-        </p:nvCxnSpPr>
-        <p:spPr>
-          <a:xfrm rot="5400000" flipH="1" flipV="1">
-            <a:off x="4706368" y="178198"/>
-            <a:ext cx="969915" cy="2271261"/>
-          </a:xfrm>
-          <a:prstGeom prst="bentConnector2">
-            <a:avLst/>
-          </a:prstGeom>
-          <a:ln>
-            <a:tailEnd type="triangle"/>
-          </a:ln>
-        </p:spPr>
-        <p:style>
-          <a:lnRef idx="1">
-            <a:schemeClr val="dk1"/>
-          </a:lnRef>
-          <a:fillRef idx="0">
-            <a:schemeClr val="dk1"/>
-          </a:fillRef>
-          <a:effectRef idx="0">
-            <a:schemeClr val="dk1"/>
-          </a:effectRef>
-          <a:fontRef idx="minor">
-            <a:schemeClr val="tx1"/>
-          </a:fontRef>
-        </p:style>
-      </p:cxnSp>
-      <p:sp>
-        <p:nvSpPr>
-          <p:cNvPr id="83" name="Diamond 82">
-            <a:extLst>
-              <a:ext uri="{FF2B5EF4-FFF2-40B4-BE49-F238E27FC236}">
-                <a16:creationId xmlns:a16="http://schemas.microsoft.com/office/drawing/2014/main" id="{932CA706-0BD1-064F-97EB-D9CEB55D3587}"/>
-              </a:ext>
-            </a:extLst>
-          </p:cNvPr>
-          <p:cNvSpPr/>
-          <p:nvPr/>
-        </p:nvSpPr>
-        <p:spPr>
-          <a:xfrm>
-            <a:off x="7563084" y="5513349"/>
-            <a:ext cx="480766" cy="480766"/>
-          </a:xfrm>
-          <a:prstGeom prst="diamond">
-            <a:avLst/>
-          </a:prstGeom>
-        </p:spPr>
-        <p:style>
-          <a:lnRef idx="1">
-            <a:schemeClr val="accent6"/>
-          </a:lnRef>
-          <a:fillRef idx="2">
-            <a:schemeClr val="accent6"/>
-          </a:fillRef>
-          <a:effectRef idx="1">
-            <a:schemeClr val="accent6"/>
-          </a:effectRef>
-          <a:fontRef idx="minor">
-            <a:schemeClr val="dk1"/>
-          </a:fontRef>
-        </p:style>
-        <p:txBody>
-          <a:bodyPr rot="0" spcFirstLastPara="0" vertOverflow="overflow" horzOverflow="overflow" vert="horz" wrap="square" lIns="91440" tIns="45721" rIns="91440" bIns="45721" numCol="1" spcCol="0" rtlCol="0" fromWordArt="0" anchor="ctr" anchorCtr="0" forceAA="0" compatLnSpc="1">
-            <a:prstTxWarp prst="textNoShape">
-              <a:avLst/>
-            </a:prstTxWarp>
-            <a:noAutofit/>
-          </a:bodyPr>
-          <a:lstStyle/>
-          <a:p>
-            <a:pPr algn="ctr"/>
-            <a:endParaRPr lang="en-SG" sz="1801"/>
-          </a:p>
-        </p:txBody>
-      </p:sp>
-      <p:cxnSp>
-        <p:nvCxnSpPr>
-          <p:cNvPr id="84" name="Elbow Connector 83">
-            <a:extLst>
-              <a:ext uri="{FF2B5EF4-FFF2-40B4-BE49-F238E27FC236}">
-                <a16:creationId xmlns:a16="http://schemas.microsoft.com/office/drawing/2014/main" id="{A95A8B32-6457-2947-A0E3-FD1F5312A29B}"/>
-              </a:ext>
-            </a:extLst>
-          </p:cNvPr>
-          <p:cNvCxnSpPr>
-            <a:cxnSpLocks/>
-            <a:stCxn id="83" idx="1"/>
-            <a:endCxn id="70" idx="2"/>
-          </p:cNvCxnSpPr>
-          <p:nvPr/>
-        </p:nvCxnSpPr>
-        <p:spPr>
-          <a:xfrm rot="10800000">
-            <a:off x="6539368" y="4538134"/>
-            <a:ext cx="1023716" cy="1215598"/>
-          </a:xfrm>
-          <a:prstGeom prst="bentConnector2">
+            <a:off x="10704075" y="2710564"/>
+            <a:ext cx="0" cy="471057"/>
+          </a:xfrm>
+          <a:prstGeom prst="straightConnector1">
             <a:avLst/>
           </a:prstGeom>
           <a:ln>
@@ -4663,24 +5129,365 @@
       </p:cxnSp>
       <p:cxnSp>
         <p:nvCxnSpPr>
-          <p:cNvPr id="85" name="Elbow Connector 84">
-            <a:extLst>
-              <a:ext uri="{FF2B5EF4-FFF2-40B4-BE49-F238E27FC236}">
-                <a16:creationId xmlns:a16="http://schemas.microsoft.com/office/drawing/2014/main" id="{FADB9A08-63BE-0F49-B673-1C2B979796B6}"/>
+          <p:cNvPr id="105" name="Elbow Connector 104">
+            <a:extLst>
+              <a:ext uri="{FF2B5EF4-FFF2-40B4-BE49-F238E27FC236}">
+                <a16:creationId xmlns:a16="http://schemas.microsoft.com/office/drawing/2014/main" id="{ED751C77-9131-614E-960A-28E4AF40BCE0}"/>
               </a:ext>
             </a:extLst>
           </p:cNvPr>
           <p:cNvCxnSpPr>
             <a:cxnSpLocks/>
-            <a:stCxn id="83" idx="3"/>
-            <a:endCxn id="78" idx="2"/>
           </p:cNvCxnSpPr>
           <p:nvPr/>
         </p:nvCxnSpPr>
         <p:spPr>
-          <a:xfrm flipV="1">
-            <a:off x="8043850" y="5066366"/>
-            <a:ext cx="994451" cy="687366"/>
+          <a:xfrm rot="5400000">
+            <a:off x="6712294" y="650995"/>
+            <a:ext cx="635166" cy="1851136"/>
+          </a:xfrm>
+          <a:prstGeom prst="bentConnector3">
+            <a:avLst>
+              <a:gd name="adj1" fmla="val 50000"/>
+            </a:avLst>
+          </a:prstGeom>
+          <a:ln>
+            <a:tailEnd type="triangle"/>
+          </a:ln>
+        </p:spPr>
+        <p:style>
+          <a:lnRef idx="1">
+            <a:schemeClr val="dk1"/>
+          </a:lnRef>
+          <a:fillRef idx="0">
+            <a:schemeClr val="dk1"/>
+          </a:fillRef>
+          <a:effectRef idx="0">
+            <a:schemeClr val="dk1"/>
+          </a:effectRef>
+          <a:fontRef idx="minor">
+            <a:schemeClr val="tx1"/>
+          </a:fontRef>
+        </p:style>
+      </p:cxnSp>
+      <p:cxnSp>
+        <p:nvCxnSpPr>
+          <p:cNvPr id="120" name="Elbow Connector 119">
+            <a:extLst>
+              <a:ext uri="{FF2B5EF4-FFF2-40B4-BE49-F238E27FC236}">
+                <a16:creationId xmlns:a16="http://schemas.microsoft.com/office/drawing/2014/main" id="{969AA04B-D243-4B4E-A86A-08A28DEE2CE8}"/>
+              </a:ext>
+            </a:extLst>
+          </p:cNvPr>
+          <p:cNvCxnSpPr>
+            <a:cxnSpLocks/>
+          </p:cNvCxnSpPr>
+          <p:nvPr/>
+        </p:nvCxnSpPr>
+        <p:spPr>
+          <a:xfrm rot="16200000" flipH="1">
+            <a:off x="9404155" y="603189"/>
+            <a:ext cx="635166" cy="1946746"/>
+          </a:xfrm>
+          <a:prstGeom prst="bentConnector3">
+            <a:avLst>
+              <a:gd name="adj1" fmla="val 50000"/>
+            </a:avLst>
+          </a:prstGeom>
+          <a:ln>
+            <a:tailEnd type="triangle"/>
+          </a:ln>
+        </p:spPr>
+        <p:style>
+          <a:lnRef idx="1">
+            <a:schemeClr val="dk1"/>
+          </a:lnRef>
+          <a:fillRef idx="0">
+            <a:schemeClr val="dk1"/>
+          </a:fillRef>
+          <a:effectRef idx="0">
+            <a:schemeClr val="dk1"/>
+          </a:effectRef>
+          <a:fontRef idx="minor">
+            <a:schemeClr val="tx1"/>
+          </a:fontRef>
+        </p:style>
+      </p:cxnSp>
+      <p:sp>
+        <p:nvSpPr>
+          <p:cNvPr id="121" name="Rectangle 120">
+            <a:extLst>
+              <a:ext uri="{FF2B5EF4-FFF2-40B4-BE49-F238E27FC236}">
+                <a16:creationId xmlns:a16="http://schemas.microsoft.com/office/drawing/2014/main" id="{946E7BC1-BDB5-6C41-8609-2EAD44911F84}"/>
+              </a:ext>
+            </a:extLst>
+          </p:cNvPr>
+          <p:cNvSpPr/>
+          <p:nvPr/>
+        </p:nvSpPr>
+        <p:spPr>
+          <a:xfrm>
+            <a:off x="6488320" y="6019301"/>
+            <a:ext cx="3662280" cy="103449"/>
+          </a:xfrm>
+          <a:prstGeom prst="rect">
+            <a:avLst/>
+          </a:prstGeom>
+        </p:spPr>
+        <p:style>
+          <a:lnRef idx="2">
+            <a:schemeClr val="dk1">
+              <a:shade val="50000"/>
+            </a:schemeClr>
+          </a:lnRef>
+          <a:fillRef idx="1">
+            <a:schemeClr val="dk1"/>
+          </a:fillRef>
+          <a:effectRef idx="0">
+            <a:schemeClr val="dk1"/>
+          </a:effectRef>
+          <a:fontRef idx="minor">
+            <a:schemeClr val="lt1"/>
+          </a:fontRef>
+        </p:style>
+        <p:txBody>
+          <a:bodyPr rtlCol="0" anchor="ctr"/>
+          <a:lstStyle/>
+          <a:p>
+            <a:pPr algn="ctr"/>
+            <a:endParaRPr lang="en-US" sz="1600"/>
+          </a:p>
+        </p:txBody>
+      </p:sp>
+      <p:cxnSp>
+        <p:nvCxnSpPr>
+          <p:cNvPr id="124" name="Elbow Connector 123">
+            <a:extLst>
+              <a:ext uri="{FF2B5EF4-FFF2-40B4-BE49-F238E27FC236}">
+                <a16:creationId xmlns:a16="http://schemas.microsoft.com/office/drawing/2014/main" id="{7DA88688-AB00-6C47-88CB-F7EFFB4FACC7}"/>
+              </a:ext>
+            </a:extLst>
+          </p:cNvPr>
+          <p:cNvCxnSpPr>
+            <a:cxnSpLocks/>
+          </p:cNvCxnSpPr>
+          <p:nvPr/>
+        </p:nvCxnSpPr>
+        <p:spPr>
+          <a:xfrm rot="16200000" flipH="1">
+            <a:off x="6766704" y="4840628"/>
+            <a:ext cx="493677" cy="1845833"/>
+          </a:xfrm>
+          <a:prstGeom prst="bentConnector3">
+            <a:avLst>
+              <a:gd name="adj1" fmla="val 50000"/>
+            </a:avLst>
+          </a:prstGeom>
+          <a:ln>
+            <a:tailEnd type="triangle"/>
+          </a:ln>
+        </p:spPr>
+        <p:style>
+          <a:lnRef idx="1">
+            <a:schemeClr val="dk1"/>
+          </a:lnRef>
+          <a:fillRef idx="0">
+            <a:schemeClr val="dk1"/>
+          </a:fillRef>
+          <a:effectRef idx="0">
+            <a:schemeClr val="dk1"/>
+          </a:effectRef>
+          <a:fontRef idx="minor">
+            <a:schemeClr val="tx1"/>
+          </a:fontRef>
+        </p:style>
+      </p:cxnSp>
+      <p:cxnSp>
+        <p:nvCxnSpPr>
+          <p:cNvPr id="126" name="Elbow Connector 125">
+            <a:extLst>
+              <a:ext uri="{FF2B5EF4-FFF2-40B4-BE49-F238E27FC236}">
+                <a16:creationId xmlns:a16="http://schemas.microsoft.com/office/drawing/2014/main" id="{6F2B6C72-73C9-1345-BCE7-254F8F22B46A}"/>
+              </a:ext>
+            </a:extLst>
+          </p:cNvPr>
+          <p:cNvCxnSpPr>
+            <a:cxnSpLocks/>
+          </p:cNvCxnSpPr>
+          <p:nvPr/>
+        </p:nvCxnSpPr>
+        <p:spPr>
+          <a:xfrm rot="5400000">
+            <a:off x="9482673" y="4794432"/>
+            <a:ext cx="479345" cy="1953991"/>
+          </a:xfrm>
+          <a:prstGeom prst="bentConnector3">
+            <a:avLst/>
+          </a:prstGeom>
+          <a:ln>
+            <a:tailEnd type="triangle"/>
+          </a:ln>
+        </p:spPr>
+        <p:style>
+          <a:lnRef idx="1">
+            <a:schemeClr val="dk1"/>
+          </a:lnRef>
+          <a:fillRef idx="0">
+            <a:schemeClr val="dk1"/>
+          </a:fillRef>
+          <a:effectRef idx="0">
+            <a:schemeClr val="dk1"/>
+          </a:effectRef>
+          <a:fontRef idx="minor">
+            <a:schemeClr val="tx1"/>
+          </a:fontRef>
+        </p:style>
+      </p:cxnSp>
+      <p:cxnSp>
+        <p:nvCxnSpPr>
+          <p:cNvPr id="205" name="Elbow Connector 204">
+            <a:extLst>
+              <a:ext uri="{FF2B5EF4-FFF2-40B4-BE49-F238E27FC236}">
+                <a16:creationId xmlns:a16="http://schemas.microsoft.com/office/drawing/2014/main" id="{63E4B0C4-04EF-FB45-A820-A12D05F43F03}"/>
+              </a:ext>
+            </a:extLst>
+          </p:cNvPr>
+          <p:cNvCxnSpPr>
+            <a:stCxn id="66" idx="2"/>
+            <a:endCxn id="80" idx="1"/>
+          </p:cNvCxnSpPr>
+          <p:nvPr/>
+        </p:nvCxnSpPr>
+        <p:spPr>
+          <a:xfrm rot="16200000" flipH="1">
+            <a:off x="5029239" y="4466791"/>
+            <a:ext cx="667324" cy="1026386"/>
+          </a:xfrm>
+          <a:prstGeom prst="bentConnector2">
+            <a:avLst/>
+          </a:prstGeom>
+          <a:ln>
+            <a:tailEnd type="triangle"/>
+          </a:ln>
+        </p:spPr>
+        <p:style>
+          <a:lnRef idx="1">
+            <a:schemeClr val="dk1"/>
+          </a:lnRef>
+          <a:fillRef idx="0">
+            <a:schemeClr val="dk1"/>
+          </a:fillRef>
+          <a:effectRef idx="0">
+            <a:schemeClr val="dk1"/>
+          </a:effectRef>
+          <a:fontRef idx="minor">
+            <a:schemeClr val="tx1"/>
+          </a:fontRef>
+        </p:style>
+      </p:cxnSp>
+      <p:cxnSp>
+        <p:nvCxnSpPr>
+          <p:cNvPr id="207" name="Elbow Connector 206">
+            <a:extLst>
+              <a:ext uri="{FF2B5EF4-FFF2-40B4-BE49-F238E27FC236}">
+                <a16:creationId xmlns:a16="http://schemas.microsoft.com/office/drawing/2014/main" id="{84D21132-B203-DA44-B611-382A123FFE1D}"/>
+              </a:ext>
+            </a:extLst>
+          </p:cNvPr>
+          <p:cNvCxnSpPr>
+            <a:stCxn id="79" idx="2"/>
+            <a:endCxn id="80" idx="3"/>
+          </p:cNvCxnSpPr>
+          <p:nvPr/>
+        </p:nvCxnSpPr>
+        <p:spPr>
+          <a:xfrm rot="5400000">
+            <a:off x="6454190" y="4488042"/>
+            <a:ext cx="667324" cy="983884"/>
+          </a:xfrm>
+          <a:prstGeom prst="bentConnector2">
+            <a:avLst/>
+          </a:prstGeom>
+          <a:ln>
+            <a:tailEnd type="triangle"/>
+          </a:ln>
+        </p:spPr>
+        <p:style>
+          <a:lnRef idx="1">
+            <a:schemeClr val="dk1"/>
+          </a:lnRef>
+          <a:fillRef idx="0">
+            <a:schemeClr val="dk1"/>
+          </a:fillRef>
+          <a:effectRef idx="0">
+            <a:schemeClr val="dk1"/>
+          </a:effectRef>
+          <a:fontRef idx="minor">
+            <a:schemeClr val="tx1"/>
+          </a:fontRef>
+        </p:style>
+      </p:cxnSp>
+      <p:cxnSp>
+        <p:nvCxnSpPr>
+          <p:cNvPr id="209" name="Elbow Connector 208">
+            <a:extLst>
+              <a:ext uri="{FF2B5EF4-FFF2-40B4-BE49-F238E27FC236}">
+                <a16:creationId xmlns:a16="http://schemas.microsoft.com/office/drawing/2014/main" id="{AD1D2C31-1043-3446-BBCB-F2A2195DECA1}"/>
+              </a:ext>
+            </a:extLst>
+          </p:cNvPr>
+          <p:cNvCxnSpPr>
+            <a:stCxn id="97" idx="2"/>
+            <a:endCxn id="101" idx="1"/>
+          </p:cNvCxnSpPr>
+          <p:nvPr/>
+        </p:nvCxnSpPr>
+        <p:spPr>
+          <a:xfrm rot="16200000" flipH="1">
+            <a:off x="9693288" y="4517286"/>
+            <a:ext cx="551343" cy="1072908"/>
+          </a:xfrm>
+          <a:prstGeom prst="bentConnector2">
+            <a:avLst/>
+          </a:prstGeom>
+          <a:ln>
+            <a:tailEnd type="triangle"/>
+          </a:ln>
+        </p:spPr>
+        <p:style>
+          <a:lnRef idx="1">
+            <a:schemeClr val="dk1"/>
+          </a:lnRef>
+          <a:fillRef idx="0">
+            <a:schemeClr val="dk1"/>
+          </a:fillRef>
+          <a:effectRef idx="0">
+            <a:schemeClr val="dk1"/>
+          </a:effectRef>
+          <a:fontRef idx="minor">
+            <a:schemeClr val="tx1"/>
+          </a:fontRef>
+        </p:style>
+      </p:cxnSp>
+      <p:cxnSp>
+        <p:nvCxnSpPr>
+          <p:cNvPr id="211" name="Elbow Connector 210">
+            <a:extLst>
+              <a:ext uri="{FF2B5EF4-FFF2-40B4-BE49-F238E27FC236}">
+                <a16:creationId xmlns:a16="http://schemas.microsoft.com/office/drawing/2014/main" id="{2F8D27E9-5401-3843-BD35-E92F6577DB01}"/>
+              </a:ext>
+            </a:extLst>
+          </p:cNvPr>
+          <p:cNvCxnSpPr>
+            <a:stCxn id="100" idx="2"/>
+            <a:endCxn id="101" idx="3"/>
+          </p:cNvCxnSpPr>
+          <p:nvPr/>
+        </p:nvCxnSpPr>
+        <p:spPr>
+          <a:xfrm rot="5400000">
+            <a:off x="11396437" y="4569248"/>
+            <a:ext cx="288957" cy="1231371"/>
           </a:xfrm>
           <a:prstGeom prst="bentConnector2">
             <a:avLst/>

</xml_diff>

<commit_message>
Make changes to UG/DG and shorten PPP
</commit_message>
<xml_diff>
--- a/docs/diagrams/SelectActivityDiagram.pptx
+++ b/docs/diagrams/SelectActivityDiagram.pptx
@@ -261,7 +261,7 @@
           <a:p>
             <a:fld id="{542F47FF-5056-41FF-A1F8-23A414798AA4}" type="datetimeFigureOut">
               <a:rPr lang="en-SG" smtClean="0"/>
-              <a:t>14/4/19</a:t>
+              <a:t>15/4/19</a:t>
             </a:fld>
             <a:endParaRPr lang="en-SG"/>
           </a:p>
@@ -461,7 +461,7 @@
           <a:p>
             <a:fld id="{542F47FF-5056-41FF-A1F8-23A414798AA4}" type="datetimeFigureOut">
               <a:rPr lang="en-SG" smtClean="0"/>
-              <a:t>14/4/19</a:t>
+              <a:t>15/4/19</a:t>
             </a:fld>
             <a:endParaRPr lang="en-SG"/>
           </a:p>
@@ -671,7 +671,7 @@
           <a:p>
             <a:fld id="{542F47FF-5056-41FF-A1F8-23A414798AA4}" type="datetimeFigureOut">
               <a:rPr lang="en-SG" smtClean="0"/>
-              <a:t>14/4/19</a:t>
+              <a:t>15/4/19</a:t>
             </a:fld>
             <a:endParaRPr lang="en-SG"/>
           </a:p>
@@ -871,7 +871,7 @@
           <a:p>
             <a:fld id="{542F47FF-5056-41FF-A1F8-23A414798AA4}" type="datetimeFigureOut">
               <a:rPr lang="en-SG" smtClean="0"/>
-              <a:t>14/4/19</a:t>
+              <a:t>15/4/19</a:t>
             </a:fld>
             <a:endParaRPr lang="en-SG"/>
           </a:p>
@@ -1147,7 +1147,7 @@
           <a:p>
             <a:fld id="{542F47FF-5056-41FF-A1F8-23A414798AA4}" type="datetimeFigureOut">
               <a:rPr lang="en-SG" smtClean="0"/>
-              <a:t>14/4/19</a:t>
+              <a:t>15/4/19</a:t>
             </a:fld>
             <a:endParaRPr lang="en-SG"/>
           </a:p>
@@ -1415,7 +1415,7 @@
           <a:p>
             <a:fld id="{542F47FF-5056-41FF-A1F8-23A414798AA4}" type="datetimeFigureOut">
               <a:rPr lang="en-SG" smtClean="0"/>
-              <a:t>14/4/19</a:t>
+              <a:t>15/4/19</a:t>
             </a:fld>
             <a:endParaRPr lang="en-SG"/>
           </a:p>
@@ -1830,7 +1830,7 @@
           <a:p>
             <a:fld id="{542F47FF-5056-41FF-A1F8-23A414798AA4}" type="datetimeFigureOut">
               <a:rPr lang="en-SG" smtClean="0"/>
-              <a:t>14/4/19</a:t>
+              <a:t>15/4/19</a:t>
             </a:fld>
             <a:endParaRPr lang="en-SG"/>
           </a:p>
@@ -1972,7 +1972,7 @@
           <a:p>
             <a:fld id="{542F47FF-5056-41FF-A1F8-23A414798AA4}" type="datetimeFigureOut">
               <a:rPr lang="en-SG" smtClean="0"/>
-              <a:t>14/4/19</a:t>
+              <a:t>15/4/19</a:t>
             </a:fld>
             <a:endParaRPr lang="en-SG"/>
           </a:p>
@@ -2085,7 +2085,7 @@
           <a:p>
             <a:fld id="{542F47FF-5056-41FF-A1F8-23A414798AA4}" type="datetimeFigureOut">
               <a:rPr lang="en-SG" smtClean="0"/>
-              <a:t>14/4/19</a:t>
+              <a:t>15/4/19</a:t>
             </a:fld>
             <a:endParaRPr lang="en-SG"/>
           </a:p>
@@ -2398,7 +2398,7 @@
           <a:p>
             <a:fld id="{542F47FF-5056-41FF-A1F8-23A414798AA4}" type="datetimeFigureOut">
               <a:rPr lang="en-SG" smtClean="0"/>
-              <a:t>14/4/19</a:t>
+              <a:t>15/4/19</a:t>
             </a:fld>
             <a:endParaRPr lang="en-SG"/>
           </a:p>
@@ -2687,7 +2687,7 @@
           <a:p>
             <a:fld id="{542F47FF-5056-41FF-A1F8-23A414798AA4}" type="datetimeFigureOut">
               <a:rPr lang="en-SG" smtClean="0"/>
-              <a:t>14/4/19</a:t>
+              <a:t>15/4/19</a:t>
             </a:fld>
             <a:endParaRPr lang="en-SG"/>
           </a:p>
@@ -2930,7 +2930,7 @@
           <a:p>
             <a:fld id="{542F47FF-5056-41FF-A1F8-23A414798AA4}" type="datetimeFigureOut">
               <a:rPr lang="en-SG" smtClean="0"/>
-              <a:t>14/4/19</a:t>
+              <a:t>15/4/19</a:t>
             </a:fld>
             <a:endParaRPr lang="en-SG"/>
           </a:p>
@@ -3361,7 +3361,7 @@
         </p:nvSpPr>
         <p:spPr>
           <a:xfrm>
-            <a:off x="-429986" y="3315932"/>
+            <a:off x="78006" y="3257876"/>
             <a:ext cx="205792" cy="205791"/>
           </a:xfrm>
           <a:prstGeom prst="ellipse">
@@ -3392,7 +3392,7 @@
           <a:lstStyle/>
           <a:p>
             <a:pPr algn="ctr"/>
-            <a:endParaRPr lang="en-SG" sz="1600"/>
+            <a:endParaRPr lang="en-SG" sz="1400"/>
           </a:p>
         </p:txBody>
       </p:sp>
@@ -3414,7 +3414,7 @@
         </p:nvCxnSpPr>
         <p:spPr>
           <a:xfrm flipV="1">
-            <a:off x="-224194" y="3418827"/>
+            <a:off x="283798" y="3360771"/>
             <a:ext cx="419816" cy="1"/>
           </a:xfrm>
           <a:prstGeom prst="straightConnector1">
@@ -3453,7 +3453,7 @@
         </p:nvSpPr>
         <p:spPr>
           <a:xfrm>
-            <a:off x="195622" y="3110800"/>
+            <a:off x="703614" y="3052744"/>
             <a:ext cx="1646229" cy="616053"/>
           </a:xfrm>
           <a:prstGeom prst="roundRect">
@@ -3485,7 +3485,7 @@
           <a:p>
             <a:pPr algn="ctr"/>
             <a:r>
-              <a:rPr lang="en-SG" sz="1600" dirty="0"/>
+              <a:rPr lang="en-SG" sz="1400" dirty="0"/>
               <a:t>User executes Select command</a:t>
             </a:r>
           </a:p>
@@ -3509,7 +3509,7 @@
         </p:nvCxnSpPr>
         <p:spPr>
           <a:xfrm>
-            <a:off x="1841851" y="3418827"/>
+            <a:off x="2349843" y="3360771"/>
             <a:ext cx="736180" cy="2137"/>
           </a:xfrm>
           <a:prstGeom prst="straightConnector1">
@@ -3548,8 +3548,8 @@
         </p:nvSpPr>
         <p:spPr>
           <a:xfrm>
-            <a:off x="1689712" y="3756531"/>
-            <a:ext cx="1073048" cy="338554"/>
+            <a:off x="2197704" y="3698475"/>
+            <a:ext cx="1073048" cy="307777"/>
           </a:xfrm>
           <a:prstGeom prst="rect">
             <a:avLst/>
@@ -3564,7 +3564,7 @@
           <a:p>
             <a:pPr algn="r"/>
             <a:r>
-              <a:rPr lang="en-SG" sz="1600" dirty="0"/>
+              <a:rPr lang="en-SG" sz="1400" dirty="0"/>
               <a:t>[else]</a:t>
             </a:r>
           </a:p>
@@ -3584,8 +3584,8 @@
         </p:nvSpPr>
         <p:spPr>
           <a:xfrm>
-            <a:off x="1217547" y="2567295"/>
-            <a:ext cx="1534029" cy="338554"/>
+            <a:off x="1725539" y="2509239"/>
+            <a:ext cx="1534029" cy="307777"/>
           </a:xfrm>
           <a:prstGeom prst="rect">
             <a:avLst/>
@@ -3600,14 +3600,14 @@
           <a:p>
             <a:pPr algn="r"/>
             <a:r>
-              <a:rPr lang="en-SG" sz="1600" dirty="0"/>
+              <a:rPr lang="en-SG" sz="1400" dirty="0"/>
               <a:t>[</a:t>
             </a:r>
             <a:r>
-              <a:rPr lang="en-US" sz="1600" dirty="0"/>
+              <a:rPr lang="en-US" sz="1400" dirty="0"/>
               <a:t>Valid index]</a:t>
             </a:r>
-            <a:endParaRPr lang="en-SG" sz="1600" dirty="0"/>
+            <a:endParaRPr lang="en-SG" sz="1400" dirty="0"/>
           </a:p>
         </p:txBody>
       </p:sp>
@@ -3625,7 +3625,7 @@
         </p:nvSpPr>
         <p:spPr>
           <a:xfrm>
-            <a:off x="1991675" y="1539295"/>
+            <a:off x="2499667" y="1481239"/>
             <a:ext cx="1592528" cy="818092"/>
           </a:xfrm>
           <a:prstGeom prst="roundRect">
@@ -3657,7 +3657,7 @@
           <a:p>
             <a:pPr algn="ctr"/>
             <a:r>
-              <a:rPr lang="en-SG" sz="1600" dirty="0"/>
+              <a:rPr lang="en-SG" sz="1400" dirty="0"/>
               <a:t>Parse index and sets selected Restaurant</a:t>
             </a:r>
           </a:p>
@@ -3677,7 +3677,7 @@
         </p:nvSpPr>
         <p:spPr>
           <a:xfrm>
-            <a:off x="2578031" y="3211056"/>
+            <a:off x="3086023" y="3153000"/>
             <a:ext cx="419816" cy="419816"/>
           </a:xfrm>
           <a:prstGeom prst="diamond">
@@ -3708,7 +3708,7 @@
           <a:lstStyle/>
           <a:p>
             <a:pPr algn="ctr"/>
-            <a:endParaRPr lang="en-SG" sz="1600"/>
+            <a:endParaRPr lang="en-SG" sz="1400"/>
           </a:p>
         </p:txBody>
       </p:sp>
@@ -3726,7 +3726,7 @@
         </p:nvSpPr>
         <p:spPr>
           <a:xfrm>
-            <a:off x="1991675" y="4338542"/>
+            <a:off x="2499667" y="4280486"/>
             <a:ext cx="1592528" cy="766637"/>
           </a:xfrm>
           <a:prstGeom prst="roundRect">
@@ -3758,7 +3758,7 @@
           <a:p>
             <a:pPr algn="ctr"/>
             <a:r>
-              <a:rPr lang="en-SG" sz="1600" dirty="0"/>
+              <a:rPr lang="en-SG" sz="1400" dirty="0"/>
               <a:t>Display invalid index error message</a:t>
             </a:r>
           </a:p>
@@ -3782,7 +3782,7 @@
         </p:nvCxnSpPr>
         <p:spPr>
           <a:xfrm flipV="1">
-            <a:off x="2787939" y="2357387"/>
+            <a:off x="3295931" y="2299331"/>
             <a:ext cx="0" cy="853669"/>
           </a:xfrm>
           <a:prstGeom prst="straightConnector1">
@@ -3825,7 +3825,7 @@
         </p:nvCxnSpPr>
         <p:spPr>
           <a:xfrm>
-            <a:off x="2787939" y="3630872"/>
+            <a:off x="3295931" y="3572816"/>
             <a:ext cx="0" cy="707670"/>
           </a:xfrm>
           <a:prstGeom prst="straightConnector1">
@@ -3864,7 +3864,7 @@
         </p:nvSpPr>
         <p:spPr>
           <a:xfrm>
-            <a:off x="6894858" y="8166"/>
+            <a:off x="6894858" y="87189"/>
             <a:ext cx="2888286" cy="787394"/>
           </a:xfrm>
           <a:prstGeom prst="roundRect">
@@ -3896,7 +3896,7 @@
           <a:p>
             <a:pPr algn="ctr"/>
             <a:r>
-              <a:rPr lang="en-SG" sz="1600" dirty="0"/>
+              <a:rPr lang="en-SG" sz="1400" dirty="0"/>
               <a:t>Listener of selected Restaurant picks up new value of selected Restaurant</a:t>
             </a:r>
           </a:p>
@@ -3920,8 +3920,8 @@
         </p:nvCxnSpPr>
         <p:spPr>
           <a:xfrm>
-            <a:off x="8339001" y="795560"/>
-            <a:ext cx="1" cy="359971"/>
+            <a:off x="8339001" y="874583"/>
+            <a:ext cx="1" cy="287401"/>
           </a:xfrm>
           <a:prstGeom prst="straightConnector1">
             <a:avLst/>
@@ -3963,8 +3963,8 @@
         </p:nvCxnSpPr>
         <p:spPr>
           <a:xfrm rot="5400000" flipH="1" flipV="1">
-            <a:off x="4272682" y="-1082880"/>
-            <a:ext cx="1137432" cy="4106919"/>
+            <a:off x="4595218" y="-818400"/>
+            <a:ext cx="1000353" cy="3598927"/>
           </a:xfrm>
           <a:prstGeom prst="bentConnector2">
             <a:avLst/>
@@ -4002,7 +4002,7 @@
         </p:nvSpPr>
         <p:spPr>
           <a:xfrm>
-            <a:off x="6507862" y="1155531"/>
+            <a:off x="6507862" y="1161984"/>
             <a:ext cx="3662280" cy="103449"/>
           </a:xfrm>
           <a:prstGeom prst="rect">
@@ -4030,7 +4030,7 @@
           <a:lstStyle/>
           <a:p>
             <a:pPr algn="ctr"/>
-            <a:endParaRPr lang="en-US" sz="1600"/>
+            <a:endParaRPr lang="en-US" sz="1400"/>
           </a:p>
         </p:txBody>
       </p:sp>
@@ -4048,7 +4048,7 @@
         </p:nvSpPr>
         <p:spPr>
           <a:xfrm>
-            <a:off x="5889219" y="3181621"/>
+            <a:off x="5900508" y="2821993"/>
             <a:ext cx="419816" cy="419816"/>
           </a:xfrm>
           <a:prstGeom prst="diamond">
@@ -4079,7 +4079,7 @@
           <a:lstStyle/>
           <a:p>
             <a:pPr algn="ctr"/>
-            <a:endParaRPr lang="en-SG" sz="1600"/>
+            <a:endParaRPr lang="en-SG" sz="1400"/>
           </a:p>
         </p:txBody>
       </p:sp>
@@ -4097,8 +4097,8 @@
         </p:nvSpPr>
         <p:spPr>
           <a:xfrm>
-            <a:off x="5320983" y="1894146"/>
-            <a:ext cx="1556288" cy="818092"/>
+            <a:off x="5320982" y="1778034"/>
+            <a:ext cx="1573875" cy="685130"/>
           </a:xfrm>
           <a:prstGeom prst="roundRect">
             <a:avLst/>
@@ -4129,7 +4129,7 @@
           <a:p>
             <a:pPr algn="ctr"/>
             <a:r>
-              <a:rPr lang="en-SG" sz="1600" dirty="0"/>
+              <a:rPr lang="en-SG" sz="1400" dirty="0"/>
               <a:t>Loads selected Restaurant’s list of Reviews</a:t>
             </a:r>
           </a:p>
@@ -4153,8 +4153,8 @@
         </p:nvCxnSpPr>
         <p:spPr>
           <a:xfrm rot="10800000" flipV="1">
-            <a:off x="4849709" y="3391529"/>
-            <a:ext cx="1039511" cy="488156"/>
+            <a:off x="5030238" y="3031900"/>
+            <a:ext cx="870270" cy="488157"/>
           </a:xfrm>
           <a:prstGeom prst="bentConnector2">
             <a:avLst/>
@@ -4192,8 +4192,8 @@
         </p:nvSpPr>
         <p:spPr>
           <a:xfrm>
-            <a:off x="4049052" y="3879685"/>
-            <a:ext cx="1601312" cy="766637"/>
+            <a:off x="4176452" y="3520058"/>
+            <a:ext cx="1707571" cy="664654"/>
           </a:xfrm>
           <a:prstGeom prst="roundRect">
             <a:avLst/>
@@ -4224,7 +4224,7 @@
           <a:p>
             <a:pPr algn="ctr"/>
             <a:r>
-              <a:rPr lang="en-SG" sz="1600" dirty="0"/>
+              <a:rPr lang="en-SG" sz="1400" dirty="0"/>
               <a:t>Display Restaurant’s list of Reviews</a:t>
             </a:r>
           </a:p>
@@ -4248,8 +4248,8 @@
         </p:nvCxnSpPr>
         <p:spPr>
           <a:xfrm>
-            <a:off x="6309035" y="3391529"/>
-            <a:ext cx="970759" cy="488156"/>
+            <a:off x="6320324" y="3031901"/>
+            <a:ext cx="955767" cy="488157"/>
           </a:xfrm>
           <a:prstGeom prst="bentConnector2">
             <a:avLst/>
@@ -4287,8 +4287,8 @@
         </p:nvSpPr>
         <p:spPr>
           <a:xfrm>
-            <a:off x="6442870" y="2967346"/>
-            <a:ext cx="882538" cy="338554"/>
+            <a:off x="6454159" y="2607718"/>
+            <a:ext cx="882538" cy="307777"/>
           </a:xfrm>
           <a:prstGeom prst="rect">
             <a:avLst/>
@@ -4302,10 +4302,10 @@
           <a:lstStyle/>
           <a:p>
             <a:r>
-              <a:rPr lang="en-US" sz="1600" dirty="0"/>
+              <a:rPr lang="en-US" sz="1400" dirty="0"/>
               <a:t>[else]</a:t>
             </a:r>
-            <a:endParaRPr lang="en-SG" sz="1600" dirty="0"/>
+            <a:endParaRPr lang="en-SG" sz="1400" dirty="0"/>
           </a:p>
         </p:txBody>
       </p:sp>
@@ -4323,8 +4323,8 @@
         </p:nvSpPr>
         <p:spPr>
           <a:xfrm>
-            <a:off x="6341885" y="3879685"/>
-            <a:ext cx="1875818" cy="766637"/>
+            <a:off x="6353174" y="3520058"/>
+            <a:ext cx="1845833" cy="631264"/>
           </a:xfrm>
           <a:prstGeom prst="roundRect">
             <a:avLst/>
@@ -4355,7 +4355,7 @@
           <a:p>
             <a:pPr algn="ctr"/>
             <a:r>
-              <a:rPr lang="en-SG" sz="1600" dirty="0"/>
+              <a:rPr lang="en-SG" sz="1400" dirty="0"/>
               <a:t>Display placeholder for Review List Panel</a:t>
             </a:r>
           </a:p>
@@ -4375,7 +4375,7 @@
         </p:nvSpPr>
         <p:spPr>
           <a:xfrm>
-            <a:off x="5876094" y="5103738"/>
+            <a:off x="5887383" y="4469953"/>
             <a:ext cx="419816" cy="419816"/>
           </a:xfrm>
           <a:prstGeom prst="diamond">
@@ -4406,7 +4406,7 @@
           <a:lstStyle/>
           <a:p>
             <a:pPr algn="ctr"/>
-            <a:endParaRPr lang="en-SG" sz="1600"/>
+            <a:endParaRPr lang="en-SG" sz="1400"/>
           </a:p>
         </p:txBody>
       </p:sp>
@@ -4424,8 +4424,8 @@
         </p:nvSpPr>
         <p:spPr>
           <a:xfrm>
-            <a:off x="2877085" y="2967347"/>
-            <a:ext cx="2959173" cy="345246"/>
+            <a:off x="3004486" y="2607719"/>
+            <a:ext cx="2959173" cy="307777"/>
           </a:xfrm>
           <a:prstGeom prst="rect">
             <a:avLst/>
@@ -4440,10 +4440,10 @@
           <a:p>
             <a:pPr algn="r"/>
             <a:r>
-              <a:rPr lang="en-US" sz="1600" dirty="0"/>
+              <a:rPr lang="en-US" sz="1400" dirty="0"/>
               <a:t>[Review List is not empty]</a:t>
             </a:r>
-            <a:endParaRPr lang="en-SG" sz="1600" dirty="0"/>
+            <a:endParaRPr lang="en-SG" sz="1400" dirty="0"/>
           </a:p>
         </p:txBody>
       </p:sp>
@@ -4461,7 +4461,7 @@
         </p:nvSpPr>
         <p:spPr>
           <a:xfrm>
-            <a:off x="10494167" y="3181621"/>
+            <a:off x="10494167" y="2821993"/>
             <a:ext cx="419816" cy="419816"/>
           </a:xfrm>
           <a:prstGeom prst="diamond">
@@ -4492,7 +4492,7 @@
           <a:lstStyle/>
           <a:p>
             <a:pPr algn="ctr"/>
-            <a:endParaRPr lang="en-SG" sz="1600"/>
+            <a:endParaRPr lang="en-SG" sz="1400"/>
           </a:p>
         </p:txBody>
       </p:sp>
@@ -4514,8 +4514,8 @@
         </p:nvCxnSpPr>
         <p:spPr>
           <a:xfrm flipH="1">
-            <a:off x="8318500" y="6122750"/>
-            <a:ext cx="960" cy="505526"/>
+            <a:off x="8318500" y="5488965"/>
+            <a:ext cx="960" cy="392636"/>
           </a:xfrm>
           <a:prstGeom prst="straightConnector1">
             <a:avLst/>
@@ -4553,7 +4553,7 @@
         </p:nvGrpSpPr>
         <p:grpSpPr>
           <a:xfrm>
-            <a:off x="8215604" y="6628276"/>
+            <a:off x="8215604" y="5881601"/>
             <a:ext cx="205792" cy="205792"/>
             <a:chOff x="8040730" y="5082186"/>
             <a:chExt cx="235669" cy="235669"/>
@@ -4607,7 +4607,7 @@
             <a:lstStyle/>
             <a:p>
               <a:pPr algn="ctr"/>
-              <a:endParaRPr lang="en-SG" sz="1600"/>
+              <a:endParaRPr lang="en-SG" sz="1400"/>
             </a:p>
           </p:txBody>
         </p:sp>
@@ -4656,7 +4656,7 @@
             <a:lstStyle/>
             <a:p>
               <a:pPr algn="ctr"/>
-              <a:endParaRPr lang="en-SG" sz="1600"/>
+              <a:endParaRPr lang="en-SG" sz="1400"/>
             </a:p>
           </p:txBody>
         </p:sp>
@@ -4675,8 +4675,8 @@
         </p:nvSpPr>
         <p:spPr>
           <a:xfrm>
-            <a:off x="9859706" y="1894328"/>
-            <a:ext cx="1688737" cy="816236"/>
+            <a:off x="9888734" y="1778216"/>
+            <a:ext cx="1628325" cy="681090"/>
           </a:xfrm>
           <a:prstGeom prst="roundRect">
             <a:avLst/>
@@ -4707,7 +4707,7 @@
           <a:p>
             <a:pPr algn="ctr"/>
             <a:r>
-              <a:rPr lang="en-SG" sz="1600" dirty="0"/>
+              <a:rPr lang="en-SG" sz="1400" dirty="0"/>
               <a:t>Loads selected Restaurant’s Summary</a:t>
             </a:r>
           </a:p>
@@ -4731,8 +4731,8 @@
         </p:nvCxnSpPr>
         <p:spPr>
           <a:xfrm rot="10800000" flipV="1">
-            <a:off x="9432505" y="3391529"/>
-            <a:ext cx="1061662" cy="323620"/>
+            <a:off x="9530813" y="3031901"/>
+            <a:ext cx="963354" cy="323620"/>
           </a:xfrm>
           <a:prstGeom prst="bentConnector2">
             <a:avLst/>
@@ -4770,8 +4770,8 @@
         </p:nvSpPr>
         <p:spPr>
           <a:xfrm>
-            <a:off x="8468694" y="2974039"/>
-            <a:ext cx="1938932" cy="338554"/>
+            <a:off x="8468694" y="2614411"/>
+            <a:ext cx="1938932" cy="307777"/>
           </a:xfrm>
           <a:prstGeom prst="rect">
             <a:avLst/>
@@ -4786,18 +4786,18 @@
           <a:p>
             <a:pPr algn="r"/>
             <a:r>
-              <a:rPr lang="en-US" sz="1600" dirty="0"/>
+              <a:rPr lang="en-US" sz="1400" dirty="0"/>
               <a:t>[</a:t>
             </a:r>
             <a:r>
-              <a:rPr lang="en-US" sz="1600" dirty="0" err="1"/>
+              <a:rPr lang="en-US" sz="1400" dirty="0" err="1"/>
               <a:t>TotalVisits</a:t>
             </a:r>
             <a:r>
-              <a:rPr lang="en-US" sz="1600" dirty="0"/>
+              <a:rPr lang="en-US" sz="1400" dirty="0"/>
               <a:t> == 0]</a:t>
             </a:r>
-            <a:endParaRPr lang="en-SG" sz="1600" dirty="0"/>
+            <a:endParaRPr lang="en-SG" sz="1400" dirty="0"/>
           </a:p>
         </p:txBody>
       </p:sp>
@@ -4815,8 +4815,8 @@
         </p:nvSpPr>
         <p:spPr>
           <a:xfrm>
-            <a:off x="8654001" y="3715149"/>
-            <a:ext cx="1557008" cy="1062920"/>
+            <a:off x="8654000" y="3355521"/>
+            <a:ext cx="1753625" cy="844068"/>
           </a:xfrm>
           <a:prstGeom prst="roundRect">
             <a:avLst/>
@@ -4847,7 +4847,7 @@
           <a:p>
             <a:pPr algn="ctr"/>
             <a:r>
-              <a:rPr lang="en-SG" sz="1600" dirty="0"/>
+              <a:rPr lang="en-SG" sz="1400" dirty="0"/>
               <a:t>Display Restaurant’s summary with ‘N.A.’ Ratings</a:t>
             </a:r>
           </a:p>
@@ -4871,8 +4871,8 @@
         </p:nvCxnSpPr>
         <p:spPr>
           <a:xfrm>
-            <a:off x="10913983" y="3391529"/>
-            <a:ext cx="1242617" cy="325162"/>
+            <a:off x="10913983" y="3031901"/>
+            <a:ext cx="1221060" cy="268717"/>
           </a:xfrm>
           <a:prstGeom prst="bentConnector2">
             <a:avLst/>
@@ -4910,8 +4910,8 @@
         </p:nvSpPr>
         <p:spPr>
           <a:xfrm>
-            <a:off x="11071907" y="2985384"/>
-            <a:ext cx="1603945" cy="338554"/>
+            <a:off x="10902429" y="2579187"/>
+            <a:ext cx="1603945" cy="307777"/>
           </a:xfrm>
           <a:prstGeom prst="rect">
             <a:avLst/>
@@ -4925,18 +4925,18 @@
           <a:lstStyle/>
           <a:p>
             <a:r>
-              <a:rPr lang="en-US" sz="1600" dirty="0"/>
+              <a:rPr lang="en-US" sz="1400" dirty="0"/>
               <a:t>[</a:t>
             </a:r>
             <a:r>
-              <a:rPr lang="en-US" sz="1600" dirty="0" err="1"/>
+              <a:rPr lang="en-US" sz="1400" dirty="0" err="1"/>
               <a:t>TotalVisits</a:t>
             </a:r>
             <a:r>
-              <a:rPr lang="en-US" sz="1600" dirty="0"/>
+              <a:rPr lang="en-US" sz="1400" dirty="0"/>
               <a:t> &gt; 0]</a:t>
             </a:r>
-            <a:endParaRPr lang="en-SG" sz="1600" dirty="0"/>
+            <a:endParaRPr lang="en-SG" sz="1400" dirty="0"/>
           </a:p>
         </p:txBody>
       </p:sp>
@@ -4954,8 +4954,8 @@
         </p:nvSpPr>
         <p:spPr>
           <a:xfrm>
-            <a:off x="10989513" y="3716691"/>
-            <a:ext cx="2334173" cy="1323764"/>
+            <a:off x="10902429" y="3300618"/>
+            <a:ext cx="2465228" cy="1116564"/>
           </a:xfrm>
           <a:prstGeom prst="roundRect">
             <a:avLst/>
@@ -4986,7 +4986,7 @@
           <a:p>
             <a:pPr algn="ctr"/>
             <a:r>
-              <a:rPr lang="en-SG" sz="1600" dirty="0"/>
+              <a:rPr lang="en-SG" sz="1400" dirty="0"/>
               <a:t>Display Restaurant’s summary with average Ratings calculated from all of the Restaurant’s Reviews</a:t>
             </a:r>
           </a:p>
@@ -5006,7 +5006,7 @@
         </p:nvSpPr>
         <p:spPr>
           <a:xfrm>
-            <a:off x="10505413" y="5119504"/>
+            <a:off x="10505413" y="4485719"/>
             <a:ext cx="419816" cy="419816"/>
           </a:xfrm>
           <a:prstGeom prst="diamond">
@@ -5037,7 +5037,7 @@
           <a:lstStyle/>
           <a:p>
             <a:pPr algn="ctr"/>
-            <a:endParaRPr lang="en-SG" sz="1600"/>
+            <a:endParaRPr lang="en-SG" sz="1400"/>
           </a:p>
         </p:txBody>
       </p:sp>
@@ -5052,15 +5052,14 @@
           </p:cNvPr>
           <p:cNvCxnSpPr>
             <a:cxnSpLocks/>
-            <a:stCxn id="64" idx="2"/>
             <a:endCxn id="57" idx="0"/>
           </p:cNvCxnSpPr>
           <p:nvPr/>
         </p:nvCxnSpPr>
         <p:spPr>
-          <a:xfrm>
-            <a:off x="6099127" y="2712238"/>
-            <a:ext cx="0" cy="469383"/>
+          <a:xfrm flipH="1">
+            <a:off x="6110416" y="2350274"/>
+            <a:ext cx="8794" cy="471719"/>
           </a:xfrm>
           <a:prstGeom prst="straightConnector1">
             <a:avLst/>
@@ -5102,8 +5101,8 @@
         </p:nvCxnSpPr>
         <p:spPr>
           <a:xfrm>
-            <a:off x="10704075" y="2710564"/>
-            <a:ext cx="0" cy="471057"/>
+            <a:off x="10702897" y="2459306"/>
+            <a:ext cx="1178" cy="362687"/>
           </a:xfrm>
           <a:prstGeom prst="straightConnector1">
             <a:avLst/>
@@ -5143,8 +5142,8 @@
         </p:nvCxnSpPr>
         <p:spPr>
           <a:xfrm rot="5400000">
-            <a:off x="6712294" y="650995"/>
-            <a:ext cx="635166" cy="1851136"/>
+            <a:off x="6741165" y="563911"/>
+            <a:ext cx="577424" cy="1851136"/>
           </a:xfrm>
           <a:prstGeom prst="bentConnector3">
             <a:avLst>
@@ -5186,8 +5185,8 @@
         </p:nvCxnSpPr>
         <p:spPr>
           <a:xfrm rot="16200000" flipH="1">
-            <a:off x="9404155" y="603189"/>
-            <a:ext cx="635166" cy="1946746"/>
+            <a:off x="9433026" y="516105"/>
+            <a:ext cx="577424" cy="1946746"/>
           </a:xfrm>
           <a:prstGeom prst="bentConnector3">
             <a:avLst>
@@ -5227,7 +5226,7 @@
         </p:nvSpPr>
         <p:spPr>
           <a:xfrm>
-            <a:off x="6488320" y="6019301"/>
+            <a:off x="6488320" y="5385516"/>
             <a:ext cx="3662280" cy="103449"/>
           </a:xfrm>
           <a:prstGeom prst="rect">
@@ -5255,7 +5254,7 @@
           <a:lstStyle/>
           <a:p>
             <a:pPr algn="ctr"/>
-            <a:endParaRPr lang="en-US" sz="1600"/>
+            <a:endParaRPr lang="en-US" sz="1400"/>
           </a:p>
         </p:txBody>
       </p:sp>
@@ -5275,7 +5274,7 @@
         </p:nvCxnSpPr>
         <p:spPr>
           <a:xfrm rot="16200000" flipH="1">
-            <a:off x="6766704" y="4840628"/>
+            <a:off x="6777993" y="4206843"/>
             <a:ext cx="493677" cy="1845833"/>
           </a:xfrm>
           <a:prstGeom prst="bentConnector3">
@@ -5318,7 +5317,7 @@
         </p:nvCxnSpPr>
         <p:spPr>
           <a:xfrm rot="5400000">
-            <a:off x="9482673" y="4794432"/>
+            <a:off x="9482673" y="4160647"/>
             <a:ext cx="479345" cy="1953991"/>
           </a:xfrm>
           <a:prstGeom prst="bentConnector3">
@@ -5353,6 +5352,7 @@
             </a:extLst>
           </p:cNvPr>
           <p:cNvCxnSpPr>
+            <a:cxnSpLocks/>
             <a:stCxn id="66" idx="2"/>
             <a:endCxn id="80" idx="1"/>
           </p:cNvCxnSpPr>
@@ -5360,8 +5360,8 @@
         </p:nvCxnSpPr>
         <p:spPr>
           <a:xfrm rot="16200000" flipH="1">
-            <a:off x="5029239" y="4466791"/>
-            <a:ext cx="667324" cy="1026386"/>
+            <a:off x="5211236" y="4003713"/>
+            <a:ext cx="495149" cy="857145"/>
           </a:xfrm>
           <a:prstGeom prst="bentConnector2">
             <a:avLst/>
@@ -5395,6 +5395,7 @@
             </a:extLst>
           </p:cNvPr>
           <p:cNvCxnSpPr>
+            <a:cxnSpLocks/>
             <a:stCxn id="79" idx="2"/>
             <a:endCxn id="80" idx="3"/>
           </p:cNvCxnSpPr>
@@ -5402,8 +5403,8 @@
         </p:nvCxnSpPr>
         <p:spPr>
           <a:xfrm rot="5400000">
-            <a:off x="6454190" y="4488042"/>
-            <a:ext cx="667324" cy="983884"/>
+            <a:off x="6527376" y="3931145"/>
+            <a:ext cx="528539" cy="968892"/>
           </a:xfrm>
           <a:prstGeom prst="bentConnector2">
             <a:avLst/>
@@ -5437,6 +5438,7 @@
             </a:extLst>
           </p:cNvPr>
           <p:cNvCxnSpPr>
+            <a:cxnSpLocks/>
             <a:stCxn id="97" idx="2"/>
             <a:endCxn id="101" idx="1"/>
           </p:cNvCxnSpPr>
@@ -5444,8 +5446,8 @@
         </p:nvCxnSpPr>
         <p:spPr>
           <a:xfrm rot="16200000" flipH="1">
-            <a:off x="9693288" y="4517286"/>
-            <a:ext cx="551343" cy="1072908"/>
+            <a:off x="9770094" y="3960308"/>
+            <a:ext cx="496038" cy="974600"/>
           </a:xfrm>
           <a:prstGeom prst="bentConnector2">
             <a:avLst/>
@@ -5479,6 +5481,7 @@
             </a:extLst>
           </p:cNvPr>
           <p:cNvCxnSpPr>
+            <a:cxnSpLocks/>
             <a:stCxn id="100" idx="2"/>
             <a:endCxn id="101" idx="3"/>
           </p:cNvCxnSpPr>
@@ -5486,8 +5489,8 @@
         </p:nvCxnSpPr>
         <p:spPr>
           <a:xfrm rot="5400000">
-            <a:off x="11396437" y="4569248"/>
-            <a:ext cx="288957" cy="1231371"/>
+            <a:off x="11390914" y="3951497"/>
+            <a:ext cx="278445" cy="1209814"/>
           </a:xfrm>
           <a:prstGeom prst="bentConnector2">
             <a:avLst/>

</xml_diff>